<commit_message>
final pptx and pdf
</commit_message>
<xml_diff>
--- a/001-First-Steps/First Steps.pptx
+++ b/001-First-Steps/First Steps.pptx
@@ -5,7 +5,7 @@
     <p:sldMasterId id="2147483648" r:id="rId1"/>
   </p:sldMasterIdLst>
   <p:notesMasterIdLst>
-    <p:notesMasterId r:id="rId37"/>
+    <p:notesMasterId r:id="rId39"/>
   </p:notesMasterIdLst>
   <p:sldIdLst>
     <p:sldId id="256" r:id="rId2"/>
@@ -30,19 +30,21 @@
     <p:sldId id="552" r:id="rId21"/>
     <p:sldId id="553" r:id="rId22"/>
     <p:sldId id="555" r:id="rId23"/>
-    <p:sldId id="554" r:id="rId24"/>
-    <p:sldId id="556" r:id="rId25"/>
-    <p:sldId id="557" r:id="rId26"/>
-    <p:sldId id="560" r:id="rId27"/>
-    <p:sldId id="558" r:id="rId28"/>
-    <p:sldId id="559" r:id="rId29"/>
-    <p:sldId id="561" r:id="rId30"/>
-    <p:sldId id="563" r:id="rId31"/>
-    <p:sldId id="564" r:id="rId32"/>
-    <p:sldId id="562" r:id="rId33"/>
-    <p:sldId id="565" r:id="rId34"/>
-    <p:sldId id="566" r:id="rId35"/>
-    <p:sldId id="539" r:id="rId36"/>
+    <p:sldId id="567" r:id="rId24"/>
+    <p:sldId id="554" r:id="rId25"/>
+    <p:sldId id="556" r:id="rId26"/>
+    <p:sldId id="557" r:id="rId27"/>
+    <p:sldId id="560" r:id="rId28"/>
+    <p:sldId id="558" r:id="rId29"/>
+    <p:sldId id="559" r:id="rId30"/>
+    <p:sldId id="561" r:id="rId31"/>
+    <p:sldId id="563" r:id="rId32"/>
+    <p:sldId id="564" r:id="rId33"/>
+    <p:sldId id="562" r:id="rId34"/>
+    <p:sldId id="565" r:id="rId35"/>
+    <p:sldId id="568" r:id="rId36"/>
+    <p:sldId id="566" r:id="rId37"/>
+    <p:sldId id="539" r:id="rId38"/>
   </p:sldIdLst>
   <p:sldSz cx="12192000" cy="6858000"/>
   <p:notesSz cx="12192000" cy="6858000"/>
@@ -155,6 +157,9 @@
           </p15:clr>
         </p15:guide>
       </p15:sldGuideLst>
+    </p:ext>
+    <p:ext uri="{2D200454-40CA-4A62-9FC3-DE9A4176ACB9}">
+      <p15:notesGuideLst xmlns:p15="http://schemas.microsoft.com/office/powerpoint/2012/main"/>
     </p:ext>
   </p:extLst>
 </p:presentation>
@@ -1402,7 +1407,7 @@
     </p:spTree>
     <p:extLst>
       <p:ext uri="{BB962C8B-B14F-4D97-AF65-F5344CB8AC3E}">
-        <p14:creationId xmlns:p14="http://schemas.microsoft.com/office/powerpoint/2010/main" val="1368195576"/>
+        <p14:creationId xmlns:p14="http://schemas.microsoft.com/office/powerpoint/2010/main" val="3931808667"/>
       </p:ext>
     </p:extLst>
   </p:cSld>
@@ -1446,6 +1451,57 @@
           </a:bodyPr>
           <a:lstStyle/>
           <a:p>
+            <a:endParaRPr dirty="0"/>
+          </a:p>
+        </p:txBody>
+      </p:sp>
+    </p:spTree>
+    <p:extLst>
+      <p:ext uri="{BB962C8B-B14F-4D97-AF65-F5344CB8AC3E}">
+        <p14:creationId xmlns:p14="http://schemas.microsoft.com/office/powerpoint/2010/main" val="1368195576"/>
+      </p:ext>
+    </p:extLst>
+  </p:cSld>
+  <p:clrMapOvr>
+    <a:masterClrMapping/>
+  </p:clrMapOvr>
+</p:notes>
+</file>
+
+<file path=ppt/notesSlides/notesSlide25.xml><?xml version="1.0" encoding="utf-8"?>
+<p:notes xmlns:a="http://schemas.openxmlformats.org/drawingml/2006/main" xmlns:r="http://schemas.openxmlformats.org/officeDocument/2006/relationships" xmlns:p="http://schemas.openxmlformats.org/presentationml/2006/main">
+  <p:cSld>
+    <p:spTree>
+      <p:nvGrpSpPr>
+        <p:cNvPr id="1" name=""/>
+        <p:cNvGrpSpPr/>
+        <p:nvPr/>
+      </p:nvGrpSpPr>
+      <p:grpSpPr>
+        <a:xfrm>
+          <a:off x="0" y="0"/>
+          <a:ext cx="0" cy="0"/>
+          <a:chOff x="0" y="0"/>
+          <a:chExt cx="0" cy="0"/>
+        </a:xfrm>
+      </p:grpSpPr>
+      <p:sp>
+        <p:nvSpPr>
+          <p:cNvPr id="2" name="Notes Placeholder"/>
+          <p:cNvSpPr>
+            <a:spLocks noGrp="1"/>
+          </p:cNvSpPr>
+          <p:nvPr>
+            <p:ph type="body" idx="1"/>
+          </p:nvPr>
+        </p:nvSpPr>
+        <p:spPr/>
+        <p:txBody>
+          <a:bodyPr>
+            <a:normAutofit fontScale="25000" lnSpcReduction="20000"/>
+          </a:bodyPr>
+          <a:lstStyle/>
+          <a:p>
             <a:pPr marL="171450" indent="-171450">
               <a:buFont typeface="Arial" panose="020B0604020202020204" pitchFamily="34" charset="0"/>
               <a:buChar char="•"/>
@@ -1488,7 +1544,7 @@
 </p:notes>
 </file>
 
-<file path=ppt/notesSlides/notesSlide25.xml><?xml version="1.0" encoding="utf-8"?>
+<file path=ppt/notesSlides/notesSlide26.xml><?xml version="1.0" encoding="utf-8"?>
 <p:notes xmlns:a="http://schemas.openxmlformats.org/drawingml/2006/main" xmlns:r="http://schemas.openxmlformats.org/officeDocument/2006/relationships" xmlns:p="http://schemas.openxmlformats.org/presentationml/2006/main">
   <p:cSld>
     <p:spTree>
@@ -1571,82 +1627,6 @@
 </p:notes>
 </file>
 
-<file path=ppt/notesSlides/notesSlide26.xml><?xml version="1.0" encoding="utf-8"?>
-<p:notes xmlns:a="http://schemas.openxmlformats.org/drawingml/2006/main" xmlns:r="http://schemas.openxmlformats.org/officeDocument/2006/relationships" xmlns:p="http://schemas.openxmlformats.org/presentationml/2006/main">
-  <p:cSld>
-    <p:spTree>
-      <p:nvGrpSpPr>
-        <p:cNvPr id="1" name=""/>
-        <p:cNvGrpSpPr/>
-        <p:nvPr/>
-      </p:nvGrpSpPr>
-      <p:grpSpPr>
-        <a:xfrm>
-          <a:off x="0" y="0"/>
-          <a:ext cx="0" cy="0"/>
-          <a:chOff x="0" y="0"/>
-          <a:chExt cx="0" cy="0"/>
-        </a:xfrm>
-      </p:grpSpPr>
-      <p:sp>
-        <p:nvSpPr>
-          <p:cNvPr id="2" name="Notes Placeholder"/>
-          <p:cNvSpPr>
-            <a:spLocks noGrp="1"/>
-          </p:cNvSpPr>
-          <p:nvPr>
-            <p:ph type="body" idx="1"/>
-          </p:nvPr>
-        </p:nvSpPr>
-        <p:spPr/>
-        <p:txBody>
-          <a:bodyPr>
-            <a:normAutofit fontScale="25000" lnSpcReduction="20000"/>
-          </a:bodyPr>
-          <a:lstStyle/>
-          <a:p>
-            <a:pPr marL="171450" indent="-171450">
-              <a:buFont typeface="Arial" panose="020B0604020202020204" pitchFamily="34" charset="0"/>
-              <a:buChar char="•"/>
-            </a:pPr>
-            <a:endParaRPr lang="en-US" dirty="0"/>
-          </a:p>
-          <a:p>
-            <a:pPr marL="171450" indent="-171450">
-              <a:buFont typeface="Arial" panose="020B0604020202020204" pitchFamily="34" charset="0"/>
-              <a:buChar char="•"/>
-            </a:pPr>
-            <a:endParaRPr lang="en-US" dirty="0"/>
-          </a:p>
-          <a:p>
-            <a:pPr marL="171450" indent="-171450">
-              <a:buFont typeface="Arial" panose="020B0604020202020204" pitchFamily="34" charset="0"/>
-              <a:buChar char="•"/>
-            </a:pPr>
-            <a:endParaRPr lang="en-US" dirty="0"/>
-          </a:p>
-          <a:p>
-            <a:pPr marL="171450" indent="-171450">
-              <a:buFont typeface="Arial" panose="020B0604020202020204" pitchFamily="34" charset="0"/>
-              <a:buChar char="•"/>
-            </a:pPr>
-            <a:endParaRPr dirty="0"/>
-          </a:p>
-        </p:txBody>
-      </p:sp>
-    </p:spTree>
-    <p:extLst>
-      <p:ext uri="{BB962C8B-B14F-4D97-AF65-F5344CB8AC3E}">
-        <p14:creationId xmlns:p14="http://schemas.microsoft.com/office/powerpoint/2010/main" val="3566922732"/>
-      </p:ext>
-    </p:extLst>
-  </p:cSld>
-  <p:clrMapOvr>
-    <a:masterClrMapping/>
-  </p:clrMapOvr>
-</p:notes>
-</file>
-
 <file path=ppt/notesSlides/notesSlide27.xml><?xml version="1.0" encoding="utf-8"?>
 <p:notes xmlns:a="http://schemas.openxmlformats.org/drawingml/2006/main" xmlns:r="http://schemas.openxmlformats.org/officeDocument/2006/relationships" xmlns:p="http://schemas.openxmlformats.org/presentationml/2006/main">
   <p:cSld>
@@ -1692,6 +1672,82 @@
               <a:buFont typeface="Arial" panose="020B0604020202020204" pitchFamily="34" charset="0"/>
               <a:buChar char="•"/>
             </a:pPr>
+            <a:endParaRPr lang="en-US" dirty="0"/>
+          </a:p>
+          <a:p>
+            <a:pPr marL="171450" indent="-171450">
+              <a:buFont typeface="Arial" panose="020B0604020202020204" pitchFamily="34" charset="0"/>
+              <a:buChar char="•"/>
+            </a:pPr>
+            <a:endParaRPr lang="en-US" dirty="0"/>
+          </a:p>
+          <a:p>
+            <a:pPr marL="171450" indent="-171450">
+              <a:buFont typeface="Arial" panose="020B0604020202020204" pitchFamily="34" charset="0"/>
+              <a:buChar char="•"/>
+            </a:pPr>
+            <a:endParaRPr dirty="0"/>
+          </a:p>
+        </p:txBody>
+      </p:sp>
+    </p:spTree>
+    <p:extLst>
+      <p:ext uri="{BB962C8B-B14F-4D97-AF65-F5344CB8AC3E}">
+        <p14:creationId xmlns:p14="http://schemas.microsoft.com/office/powerpoint/2010/main" val="3566922732"/>
+      </p:ext>
+    </p:extLst>
+  </p:cSld>
+  <p:clrMapOvr>
+    <a:masterClrMapping/>
+  </p:clrMapOvr>
+</p:notes>
+</file>
+
+<file path=ppt/notesSlides/notesSlide28.xml><?xml version="1.0" encoding="utf-8"?>
+<p:notes xmlns:a="http://schemas.openxmlformats.org/drawingml/2006/main" xmlns:r="http://schemas.openxmlformats.org/officeDocument/2006/relationships" xmlns:p="http://schemas.openxmlformats.org/presentationml/2006/main">
+  <p:cSld>
+    <p:spTree>
+      <p:nvGrpSpPr>
+        <p:cNvPr id="1" name=""/>
+        <p:cNvGrpSpPr/>
+        <p:nvPr/>
+      </p:nvGrpSpPr>
+      <p:grpSpPr>
+        <a:xfrm>
+          <a:off x="0" y="0"/>
+          <a:ext cx="0" cy="0"/>
+          <a:chOff x="0" y="0"/>
+          <a:chExt cx="0" cy="0"/>
+        </a:xfrm>
+      </p:grpSpPr>
+      <p:sp>
+        <p:nvSpPr>
+          <p:cNvPr id="2" name="Notes Placeholder"/>
+          <p:cNvSpPr>
+            <a:spLocks noGrp="1"/>
+          </p:cNvSpPr>
+          <p:nvPr>
+            <p:ph type="body" idx="1"/>
+          </p:nvPr>
+        </p:nvSpPr>
+        <p:spPr/>
+        <p:txBody>
+          <a:bodyPr>
+            <a:normAutofit fontScale="25000" lnSpcReduction="20000"/>
+          </a:bodyPr>
+          <a:lstStyle/>
+          <a:p>
+            <a:pPr marL="171450" indent="-171450">
+              <a:buFont typeface="Arial" panose="020B0604020202020204" pitchFamily="34" charset="0"/>
+              <a:buChar char="•"/>
+            </a:pPr>
+            <a:endParaRPr lang="en-US" dirty="0"/>
+          </a:p>
+          <a:p>
+            <a:pPr marL="171450" indent="-171450">
+              <a:buFont typeface="Arial" panose="020B0604020202020204" pitchFamily="34" charset="0"/>
+              <a:buChar char="•"/>
+            </a:pPr>
             <a:r>
               <a:rPr lang="en-US" dirty="0"/>
               <a:t>What is the index of the first character?</a:t>
@@ -1756,7 +1812,7 @@
 </p:notes>
 </file>
 
-<file path=ppt/notesSlides/notesSlide28.xml><?xml version="1.0" encoding="utf-8"?>
+<file path=ppt/notesSlides/notesSlide29.xml><?xml version="1.0" encoding="utf-8"?>
 <p:notes xmlns:a="http://schemas.openxmlformats.org/drawingml/2006/main" xmlns:r="http://schemas.openxmlformats.org/officeDocument/2006/relationships" xmlns:p="http://schemas.openxmlformats.org/presentationml/2006/main">
   <p:cSld>
     <p:spTree>
@@ -1839,82 +1895,6 @@
 </p:notes>
 </file>
 
-<file path=ppt/notesSlides/notesSlide29.xml><?xml version="1.0" encoding="utf-8"?>
-<p:notes xmlns:a="http://schemas.openxmlformats.org/drawingml/2006/main" xmlns:r="http://schemas.openxmlformats.org/officeDocument/2006/relationships" xmlns:p="http://schemas.openxmlformats.org/presentationml/2006/main">
-  <p:cSld>
-    <p:spTree>
-      <p:nvGrpSpPr>
-        <p:cNvPr id="1" name=""/>
-        <p:cNvGrpSpPr/>
-        <p:nvPr/>
-      </p:nvGrpSpPr>
-      <p:grpSpPr>
-        <a:xfrm>
-          <a:off x="0" y="0"/>
-          <a:ext cx="0" cy="0"/>
-          <a:chOff x="0" y="0"/>
-          <a:chExt cx="0" cy="0"/>
-        </a:xfrm>
-      </p:grpSpPr>
-      <p:sp>
-        <p:nvSpPr>
-          <p:cNvPr id="2" name="Notes Placeholder"/>
-          <p:cNvSpPr>
-            <a:spLocks noGrp="1"/>
-          </p:cNvSpPr>
-          <p:nvPr>
-            <p:ph type="body" idx="1"/>
-          </p:nvPr>
-        </p:nvSpPr>
-        <p:spPr/>
-        <p:txBody>
-          <a:bodyPr>
-            <a:normAutofit fontScale="25000" lnSpcReduction="20000"/>
-          </a:bodyPr>
-          <a:lstStyle/>
-          <a:p>
-            <a:pPr marL="171450" indent="-171450">
-              <a:buFont typeface="Arial" panose="020B0604020202020204" pitchFamily="34" charset="0"/>
-              <a:buChar char="•"/>
-            </a:pPr>
-            <a:endParaRPr lang="en-US" dirty="0"/>
-          </a:p>
-          <a:p>
-            <a:pPr marL="171450" indent="-171450">
-              <a:buFont typeface="Arial" panose="020B0604020202020204" pitchFamily="34" charset="0"/>
-              <a:buChar char="•"/>
-            </a:pPr>
-            <a:endParaRPr lang="en-US" dirty="0"/>
-          </a:p>
-          <a:p>
-            <a:pPr marL="171450" indent="-171450">
-              <a:buFont typeface="Arial" panose="020B0604020202020204" pitchFamily="34" charset="0"/>
-              <a:buChar char="•"/>
-            </a:pPr>
-            <a:endParaRPr lang="en-US" dirty="0"/>
-          </a:p>
-          <a:p>
-            <a:pPr marL="171450" indent="-171450">
-              <a:buFont typeface="Arial" panose="020B0604020202020204" pitchFamily="34" charset="0"/>
-              <a:buChar char="•"/>
-            </a:pPr>
-            <a:endParaRPr dirty="0"/>
-          </a:p>
-        </p:txBody>
-      </p:sp>
-    </p:spTree>
-    <p:extLst>
-      <p:ext uri="{BB962C8B-B14F-4D97-AF65-F5344CB8AC3E}">
-        <p14:creationId xmlns:p14="http://schemas.microsoft.com/office/powerpoint/2010/main" val="3441186602"/>
-      </p:ext>
-    </p:extLst>
-  </p:cSld>
-  <p:clrMapOvr>
-    <a:masterClrMapping/>
-  </p:clrMapOvr>
-</p:notes>
-</file>
-
 <file path=ppt/notesSlides/notesSlide3.xml><?xml version="1.0" encoding="utf-8"?>
 <p:notes xmlns:a="http://schemas.openxmlformats.org/drawingml/2006/main" xmlns:r="http://schemas.openxmlformats.org/officeDocument/2006/relationships" xmlns:p="http://schemas.openxmlformats.org/presentationml/2006/main">
   <p:cSld>
@@ -2032,7 +2012,7 @@
     </p:spTree>
     <p:extLst>
       <p:ext uri="{BB962C8B-B14F-4D97-AF65-F5344CB8AC3E}">
-        <p14:creationId xmlns:p14="http://schemas.microsoft.com/office/powerpoint/2010/main" val="3772545776"/>
+        <p14:creationId xmlns:p14="http://schemas.microsoft.com/office/powerpoint/2010/main" val="3441186602"/>
       </p:ext>
     </p:extLst>
   </p:cSld>
@@ -2108,6 +2088,82 @@
     </p:spTree>
     <p:extLst>
       <p:ext uri="{BB962C8B-B14F-4D97-AF65-F5344CB8AC3E}">
+        <p14:creationId xmlns:p14="http://schemas.microsoft.com/office/powerpoint/2010/main" val="3772545776"/>
+      </p:ext>
+    </p:extLst>
+  </p:cSld>
+  <p:clrMapOvr>
+    <a:masterClrMapping/>
+  </p:clrMapOvr>
+</p:notes>
+</file>
+
+<file path=ppt/notesSlides/notesSlide32.xml><?xml version="1.0" encoding="utf-8"?>
+<p:notes xmlns:a="http://schemas.openxmlformats.org/drawingml/2006/main" xmlns:r="http://schemas.openxmlformats.org/officeDocument/2006/relationships" xmlns:p="http://schemas.openxmlformats.org/presentationml/2006/main">
+  <p:cSld>
+    <p:spTree>
+      <p:nvGrpSpPr>
+        <p:cNvPr id="1" name=""/>
+        <p:cNvGrpSpPr/>
+        <p:nvPr/>
+      </p:nvGrpSpPr>
+      <p:grpSpPr>
+        <a:xfrm>
+          <a:off x="0" y="0"/>
+          <a:ext cx="0" cy="0"/>
+          <a:chOff x="0" y="0"/>
+          <a:chExt cx="0" cy="0"/>
+        </a:xfrm>
+      </p:grpSpPr>
+      <p:sp>
+        <p:nvSpPr>
+          <p:cNvPr id="2" name="Notes Placeholder"/>
+          <p:cNvSpPr>
+            <a:spLocks noGrp="1"/>
+          </p:cNvSpPr>
+          <p:nvPr>
+            <p:ph type="body" idx="1"/>
+          </p:nvPr>
+        </p:nvSpPr>
+        <p:spPr/>
+        <p:txBody>
+          <a:bodyPr>
+            <a:normAutofit fontScale="25000" lnSpcReduction="20000"/>
+          </a:bodyPr>
+          <a:lstStyle/>
+          <a:p>
+            <a:pPr marL="171450" indent="-171450">
+              <a:buFont typeface="Arial" panose="020B0604020202020204" pitchFamily="34" charset="0"/>
+              <a:buChar char="•"/>
+            </a:pPr>
+            <a:endParaRPr lang="en-US" dirty="0"/>
+          </a:p>
+          <a:p>
+            <a:pPr marL="171450" indent="-171450">
+              <a:buFont typeface="Arial" panose="020B0604020202020204" pitchFamily="34" charset="0"/>
+              <a:buChar char="•"/>
+            </a:pPr>
+            <a:endParaRPr lang="en-US" dirty="0"/>
+          </a:p>
+          <a:p>
+            <a:pPr marL="171450" indent="-171450">
+              <a:buFont typeface="Arial" panose="020B0604020202020204" pitchFamily="34" charset="0"/>
+              <a:buChar char="•"/>
+            </a:pPr>
+            <a:endParaRPr lang="en-US" dirty="0"/>
+          </a:p>
+          <a:p>
+            <a:pPr marL="171450" indent="-171450">
+              <a:buFont typeface="Arial" panose="020B0604020202020204" pitchFamily="34" charset="0"/>
+              <a:buChar char="•"/>
+            </a:pPr>
+            <a:endParaRPr dirty="0"/>
+          </a:p>
+        </p:txBody>
+      </p:sp>
+    </p:spTree>
+    <p:extLst>
+      <p:ext uri="{BB962C8B-B14F-4D97-AF65-F5344CB8AC3E}">
         <p14:creationId xmlns:p14="http://schemas.microsoft.com/office/powerpoint/2010/main" val="4186334614"/>
       </p:ext>
     </p:extLst>
@@ -2118,7 +2174,7 @@
 </p:notes>
 </file>
 
-<file path=ppt/notesSlides/notesSlide32.xml><?xml version="1.0" encoding="utf-8"?>
+<file path=ppt/notesSlides/notesSlide33.xml><?xml version="1.0" encoding="utf-8"?>
 <p:notes xmlns:a="http://schemas.openxmlformats.org/drawingml/2006/main" xmlns:r="http://schemas.openxmlformats.org/officeDocument/2006/relationships" xmlns:p="http://schemas.openxmlformats.org/presentationml/2006/main">
   <p:cSld>
     <p:spTree>
@@ -2201,7 +2257,7 @@
 </p:notes>
 </file>
 
-<file path=ppt/notesSlides/notesSlide33.xml><?xml version="1.0" encoding="utf-8"?>
+<file path=ppt/notesSlides/notesSlide34.xml><?xml version="1.0" encoding="utf-8"?>
 <p:notes xmlns:a="http://schemas.openxmlformats.org/drawingml/2006/main" xmlns:r="http://schemas.openxmlformats.org/officeDocument/2006/relationships" xmlns:p="http://schemas.openxmlformats.org/presentationml/2006/main">
   <p:cSld>
     <p:spTree>
@@ -2291,7 +2347,58 @@
 </p:notes>
 </file>
 
-<file path=ppt/notesSlides/notesSlide34.xml><?xml version="1.0" encoding="utf-8"?>
+<file path=ppt/notesSlides/notesSlide35.xml><?xml version="1.0" encoding="utf-8"?>
+<p:notes xmlns:a="http://schemas.openxmlformats.org/drawingml/2006/main" xmlns:r="http://schemas.openxmlformats.org/officeDocument/2006/relationships" xmlns:p="http://schemas.openxmlformats.org/presentationml/2006/main">
+  <p:cSld>
+    <p:spTree>
+      <p:nvGrpSpPr>
+        <p:cNvPr id="1" name=""/>
+        <p:cNvGrpSpPr/>
+        <p:nvPr/>
+      </p:nvGrpSpPr>
+      <p:grpSpPr>
+        <a:xfrm>
+          <a:off x="0" y="0"/>
+          <a:ext cx="0" cy="0"/>
+          <a:chOff x="0" y="0"/>
+          <a:chExt cx="0" cy="0"/>
+        </a:xfrm>
+      </p:grpSpPr>
+      <p:sp>
+        <p:nvSpPr>
+          <p:cNvPr id="2" name="Notes Placeholder"/>
+          <p:cNvSpPr>
+            <a:spLocks noGrp="1"/>
+          </p:cNvSpPr>
+          <p:nvPr>
+            <p:ph type="body" idx="1"/>
+          </p:nvPr>
+        </p:nvSpPr>
+        <p:spPr/>
+        <p:txBody>
+          <a:bodyPr>
+            <a:normAutofit fontScale="25000" lnSpcReduction="20000"/>
+          </a:bodyPr>
+          <a:lstStyle/>
+          <a:p>
+            <a:endParaRPr dirty="0"/>
+          </a:p>
+        </p:txBody>
+      </p:sp>
+    </p:spTree>
+    <p:extLst>
+      <p:ext uri="{BB962C8B-B14F-4D97-AF65-F5344CB8AC3E}">
+        <p14:creationId xmlns:p14="http://schemas.microsoft.com/office/powerpoint/2010/main" val="3557346478"/>
+      </p:ext>
+    </p:extLst>
+  </p:cSld>
+  <p:clrMapOvr>
+    <a:masterClrMapping/>
+  </p:clrMapOvr>
+</p:notes>
+</file>
+
+<file path=ppt/notesSlides/notesSlide36.xml><?xml version="1.0" encoding="utf-8"?>
 <p:notes xmlns:a="http://schemas.openxmlformats.org/drawingml/2006/main" xmlns:r="http://schemas.openxmlformats.org/officeDocument/2006/relationships" xmlns:p="http://schemas.openxmlformats.org/presentationml/2006/main">
   <p:cSld>
     <p:spTree>
@@ -12490,6 +12597,414 @@
       </p:grpSpPr>
       <p:sp>
         <p:nvSpPr>
+          <p:cNvPr id="3" name="object 3"/>
+          <p:cNvSpPr/>
+          <p:nvPr/>
+        </p:nvSpPr>
+        <p:spPr>
+          <a:xfrm>
+            <a:off x="1930907" y="1059178"/>
+            <a:ext cx="10261091" cy="5798821"/>
+          </a:xfrm>
+          <a:prstGeom prst="rect">
+            <a:avLst/>
+          </a:prstGeom>
+          <a:blipFill>
+            <a:blip r:embed="rId3" cstate="print"/>
+            <a:stretch>
+              <a:fillRect/>
+            </a:stretch>
+          </a:blipFill>
+        </p:spPr>
+        <p:txBody>
+          <a:bodyPr wrap="square" lIns="0" tIns="0" rIns="0" bIns="0" rtlCol="0"/>
+          <a:lstStyle/>
+          <a:p>
+            <a:endParaRPr/>
+          </a:p>
+        </p:txBody>
+      </p:sp>
+      <p:sp>
+        <p:nvSpPr>
+          <p:cNvPr id="4" name="object 4"/>
+          <p:cNvSpPr txBox="1">
+            <a:spLocks noGrp="1"/>
+          </p:cNvSpPr>
+          <p:nvPr>
+            <p:ph type="title"/>
+          </p:nvPr>
+        </p:nvSpPr>
+        <p:spPr>
+          <a:xfrm>
+            <a:off x="2209800" y="378886"/>
+            <a:ext cx="9199246" cy="384721"/>
+          </a:xfrm>
+          <a:prstGeom prst="rect">
+            <a:avLst/>
+          </a:prstGeom>
+        </p:spPr>
+        <p:txBody>
+          <a:bodyPr vert="horz" wrap="square" lIns="0" tIns="0" rIns="0" bIns="0" rtlCol="0">
+            <a:spAutoFit/>
+          </a:bodyPr>
+          <a:lstStyle/>
+          <a:p>
+            <a:pPr marL="1564640">
+              <a:lnSpc>
+                <a:spcPct val="100000"/>
+              </a:lnSpc>
+            </a:pPr>
+            <a:r>
+              <a:rPr lang="en-US" spc="-20" dirty="0"/>
+              <a:t>Chapter</a:t>
+            </a:r>
+            <a:r>
+              <a:rPr spc="-25" dirty="0"/>
+              <a:t> </a:t>
+            </a:r>
+            <a:r>
+              <a:rPr spc="-20" dirty="0"/>
+              <a:t>Summary</a:t>
+            </a:r>
+          </a:p>
+        </p:txBody>
+      </p:sp>
+      <p:sp>
+        <p:nvSpPr>
+          <p:cNvPr id="6" name="object 6"/>
+          <p:cNvSpPr txBox="1">
+            <a:spLocks noGrp="1"/>
+          </p:cNvSpPr>
+          <p:nvPr>
+            <p:ph type="sldNum" sz="quarter" idx="7"/>
+          </p:nvPr>
+        </p:nvSpPr>
+        <p:spPr>
+          <a:xfrm>
+            <a:off x="10864985" y="6661976"/>
+            <a:ext cx="1071245" cy="246221"/>
+          </a:xfrm>
+          <a:prstGeom prst="rect">
+            <a:avLst/>
+          </a:prstGeom>
+        </p:spPr>
+        <p:txBody>
+          <a:bodyPr vert="horz" wrap="square" lIns="0" tIns="0" rIns="0" bIns="0" rtlCol="0">
+            <a:spAutoFit/>
+          </a:bodyPr>
+          <a:lstStyle/>
+          <a:p>
+            <a:pPr marL="12700">
+              <a:lnSpc>
+                <a:spcPct val="100000"/>
+              </a:lnSpc>
+            </a:pPr>
+            <a:r>
+              <a:rPr spc="-5" dirty="0"/>
+              <a:t>Cop</a:t>
+            </a:r>
+            <a:r>
+              <a:rPr spc="-10" dirty="0"/>
+              <a:t>y</a:t>
+            </a:r>
+            <a:r>
+              <a:rPr spc="-5" dirty="0"/>
+              <a:t>r</a:t>
+            </a:r>
+            <a:r>
+              <a:rPr dirty="0"/>
+              <a:t>ig</a:t>
+            </a:r>
+            <a:r>
+              <a:rPr spc="-5" dirty="0"/>
+              <a:t>h</a:t>
+            </a:r>
+            <a:r>
+              <a:rPr dirty="0"/>
+              <a:t>t</a:t>
+            </a:r>
+            <a:r>
+              <a:rPr spc="20" dirty="0"/>
+              <a:t> </a:t>
+            </a:r>
+            <a:r>
+              <a:rPr dirty="0"/>
+              <a:t>© </a:t>
+            </a:r>
+            <a:r>
+              <a:rPr spc="-5" dirty="0"/>
+              <a:t>201</a:t>
+            </a:r>
+            <a:r>
+              <a:rPr dirty="0"/>
+              <a:t>8</a:t>
+            </a:r>
+            <a:r>
+              <a:rPr spc="25" dirty="0"/>
+              <a:t> </a:t>
+            </a:r>
+            <a:r>
+              <a:rPr dirty="0"/>
+              <a:t>| </a:t>
+            </a:r>
+            <a:r>
+              <a:rPr spc="85" dirty="0"/>
+              <a:t> </a:t>
+            </a:r>
+            <a:r>
+              <a:rPr dirty="0">
+                <a:solidFill>
+                  <a:srgbClr val="000000"/>
+                </a:solidFill>
+              </a:rPr>
+              <a:t>49</a:t>
+            </a:r>
+          </a:p>
+        </p:txBody>
+      </p:sp>
+      <p:sp>
+        <p:nvSpPr>
+          <p:cNvPr id="5" name="object 5"/>
+          <p:cNvSpPr txBox="1"/>
+          <p:nvPr/>
+        </p:nvSpPr>
+        <p:spPr>
+          <a:xfrm>
+            <a:off x="3965578" y="1626685"/>
+            <a:ext cx="6341745" cy="1938992"/>
+          </a:xfrm>
+          <a:prstGeom prst="rect">
+            <a:avLst/>
+          </a:prstGeom>
+        </p:spPr>
+        <p:txBody>
+          <a:bodyPr vert="horz" wrap="square" lIns="0" tIns="0" rIns="0" bIns="0" rtlCol="0">
+            <a:spAutoFit/>
+          </a:bodyPr>
+          <a:lstStyle/>
+          <a:p>
+            <a:pPr marL="12700">
+              <a:lnSpc>
+                <a:spcPct val="100000"/>
+              </a:lnSpc>
+            </a:pPr>
+            <a:r>
+              <a:rPr lang="en-US" spc="-10" dirty="0">
+                <a:latin typeface="Arial"/>
+                <a:cs typeface="Arial"/>
+              </a:rPr>
+              <a:t>This chapter covered the following:</a:t>
+            </a:r>
+          </a:p>
+          <a:p>
+            <a:pPr marL="12700">
+              <a:lnSpc>
+                <a:spcPct val="100000"/>
+              </a:lnSpc>
+            </a:pPr>
+            <a:endParaRPr lang="en-US" spc="-10" dirty="0">
+              <a:latin typeface="Arial"/>
+              <a:cs typeface="Arial"/>
+            </a:endParaRPr>
+          </a:p>
+          <a:p>
+            <a:pPr marL="298450" indent="-285750">
+              <a:lnSpc>
+                <a:spcPct val="100000"/>
+              </a:lnSpc>
+              <a:buFont typeface="Zapf Dingbats"/>
+              <a:buChar char="➠"/>
+            </a:pPr>
+            <a:r>
+              <a:rPr lang="en-US" dirty="0">
+                <a:latin typeface="Arial"/>
+                <a:cs typeface="Arial"/>
+              </a:rPr>
+              <a:t>Basic numeric types in Python: </a:t>
+            </a:r>
+            <a:r>
+              <a:rPr lang="en-US" dirty="0" err="1">
+                <a:latin typeface="Consolas" panose="020B0609020204030204" pitchFamily="49" charset="0"/>
+                <a:cs typeface="Consolas" panose="020B0609020204030204" pitchFamily="49" charset="0"/>
+              </a:rPr>
+              <a:t>int</a:t>
+            </a:r>
+            <a:r>
+              <a:rPr lang="en-US" dirty="0">
+                <a:latin typeface="Arial"/>
+                <a:cs typeface="Arial"/>
+              </a:rPr>
+              <a:t> and </a:t>
+            </a:r>
+            <a:r>
+              <a:rPr lang="en-US" dirty="0">
+                <a:latin typeface="Consolas" panose="020B0609020204030204" pitchFamily="49" charset="0"/>
+                <a:cs typeface="Consolas" panose="020B0609020204030204" pitchFamily="49" charset="0"/>
+              </a:rPr>
+              <a:t>float</a:t>
+            </a:r>
+          </a:p>
+          <a:p>
+            <a:pPr marL="298450" indent="-285750">
+              <a:lnSpc>
+                <a:spcPct val="100000"/>
+              </a:lnSpc>
+              <a:buFont typeface="Zapf Dingbats"/>
+              <a:buChar char="➠"/>
+            </a:pPr>
+            <a:r>
+              <a:rPr lang="en-US" dirty="0">
+                <a:latin typeface="Arial" panose="020B0604020202020204" pitchFamily="34" charset="0"/>
+                <a:cs typeface="Arial" panose="020B0604020202020204" pitchFamily="34" charset="0"/>
+              </a:rPr>
+              <a:t>Simple math operations using operators</a:t>
+            </a:r>
+          </a:p>
+          <a:p>
+            <a:pPr marL="298450" indent="-285750">
+              <a:lnSpc>
+                <a:spcPct val="100000"/>
+              </a:lnSpc>
+              <a:buFont typeface="Zapf Dingbats"/>
+              <a:buChar char="➠"/>
+            </a:pPr>
+            <a:r>
+              <a:rPr lang="en-US" dirty="0">
+                <a:latin typeface="Arial" panose="020B0604020202020204" pitchFamily="34" charset="0"/>
+                <a:cs typeface="Arial" panose="020B0604020202020204" pitchFamily="34" charset="0"/>
+              </a:rPr>
+              <a:t>Order of operations in Python</a:t>
+            </a:r>
+          </a:p>
+          <a:p>
+            <a:pPr marL="298450" indent="-285750">
+              <a:lnSpc>
+                <a:spcPct val="100000"/>
+              </a:lnSpc>
+              <a:buFont typeface="Zapf Dingbats"/>
+              <a:buChar char="➠"/>
+            </a:pPr>
+            <a:r>
+              <a:rPr lang="en-US" dirty="0">
+                <a:latin typeface="Arial" panose="020B0604020202020204" pitchFamily="34" charset="0"/>
+                <a:cs typeface="Arial" panose="020B0604020202020204" pitchFamily="34" charset="0"/>
+              </a:rPr>
+              <a:t>Complex number type</a:t>
+            </a:r>
+          </a:p>
+          <a:p>
+            <a:pPr marL="298450" indent="-285750">
+              <a:lnSpc>
+                <a:spcPct val="100000"/>
+              </a:lnSpc>
+              <a:buFont typeface="Zapf Dingbats"/>
+              <a:buChar char="➠"/>
+            </a:pPr>
+            <a:r>
+              <a:rPr lang="en-US" dirty="0">
+                <a:latin typeface="Arial" panose="020B0604020202020204" pitchFamily="34" charset="0"/>
+                <a:cs typeface="Arial" panose="020B0604020202020204" pitchFamily="34" charset="0"/>
+              </a:rPr>
+              <a:t>Deeper math functions from the </a:t>
+            </a:r>
+            <a:r>
+              <a:rPr lang="en-US" dirty="0">
+                <a:latin typeface="Consolas" panose="020B0609020204030204" pitchFamily="49" charset="0"/>
+                <a:cs typeface="Consolas" panose="020B0609020204030204" pitchFamily="49" charset="0"/>
+              </a:rPr>
+              <a:t>math</a:t>
+            </a:r>
+            <a:r>
+              <a:rPr lang="en-US" dirty="0">
+                <a:latin typeface="Arial" panose="020B0604020202020204" pitchFamily="34" charset="0"/>
+                <a:cs typeface="Arial" panose="020B0604020202020204" pitchFamily="34" charset="0"/>
+              </a:rPr>
+              <a:t> module</a:t>
+            </a:r>
+          </a:p>
+        </p:txBody>
+      </p:sp>
+      <p:sp>
+        <p:nvSpPr>
+          <p:cNvPr id="7" name="object 2">
+            <a:extLst>
+              <a:ext uri="{FF2B5EF4-FFF2-40B4-BE49-F238E27FC236}">
+                <a16:creationId xmlns:a16="http://schemas.microsoft.com/office/drawing/2014/main" id="{9277B201-E278-DE48-98B0-34E967E6F14B}"/>
+              </a:ext>
+            </a:extLst>
+          </p:cNvPr>
+          <p:cNvSpPr txBox="1"/>
+          <p:nvPr/>
+        </p:nvSpPr>
+        <p:spPr>
+          <a:xfrm>
+            <a:off x="150678" y="216496"/>
+            <a:ext cx="1659255" cy="492443"/>
+          </a:xfrm>
+          <a:prstGeom prst="rect">
+            <a:avLst/>
+          </a:prstGeom>
+        </p:spPr>
+        <p:txBody>
+          <a:bodyPr vert="horz" wrap="square" lIns="0" tIns="0" rIns="0" bIns="0" rtlCol="0">
+            <a:spAutoFit/>
+          </a:bodyPr>
+          <a:lstStyle/>
+          <a:p>
+            <a:pPr marL="12700" marR="5080">
+              <a:lnSpc>
+                <a:spcPct val="100000"/>
+              </a:lnSpc>
+            </a:pPr>
+            <a:r>
+              <a:rPr lang="en-US" sz="1600" spc="-10" dirty="0">
+                <a:solidFill>
+                  <a:srgbClr val="FFFFFF"/>
+                </a:solidFill>
+                <a:latin typeface="Arial"/>
+                <a:cs typeface="Arial"/>
+              </a:rPr>
+              <a:t>Python 3 Beginner</a:t>
+            </a:r>
+            <a:endParaRPr sz="1600" dirty="0">
+              <a:latin typeface="Arial"/>
+              <a:cs typeface="Arial"/>
+            </a:endParaRPr>
+          </a:p>
+        </p:txBody>
+      </p:sp>
+    </p:spTree>
+    <p:extLst>
+      <p:ext uri="{BB962C8B-B14F-4D97-AF65-F5344CB8AC3E}">
+        <p14:creationId xmlns:p14="http://schemas.microsoft.com/office/powerpoint/2010/main" val="667575972"/>
+      </p:ext>
+    </p:extLst>
+  </p:cSld>
+  <p:clrMapOvr>
+    <a:masterClrMapping/>
+  </p:clrMapOvr>
+</p:sld>
+</file>
+
+<file path=ppt/slides/slide24.xml><?xml version="1.0" encoding="utf-8"?>
+<p:sld xmlns:a="http://schemas.openxmlformats.org/drawingml/2006/main" xmlns:r="http://schemas.openxmlformats.org/officeDocument/2006/relationships" xmlns:p="http://schemas.openxmlformats.org/presentationml/2006/main">
+  <p:cSld>
+    <p:spTree>
+      <p:nvGrpSpPr>
+        <p:cNvPr id="1" name=""/>
+        <p:cNvGrpSpPr/>
+        <p:nvPr/>
+      </p:nvGrpSpPr>
+      <p:grpSpPr>
+        <a:xfrm>
+          <a:off x="0" y="0"/>
+          <a:ext cx="0" cy="0"/>
+          <a:chOff x="0" y="0"/>
+          <a:chExt cx="0" cy="0"/>
+        </a:xfrm>
+      </p:grpSpPr>
+      <p:sp>
+        <p:nvSpPr>
           <p:cNvPr id="2" name="object 2"/>
           <p:cNvSpPr/>
           <p:nvPr/>
@@ -12918,7 +13433,7 @@
                   <a:spcPct val="100000"/>
                 </a:lnSpc>
               </a:pPr>
-              <a:t>23</a:t>
+              <a:t>24</a:t>
             </a:fld>
             <a:endParaRPr dirty="0">
               <a:solidFill>
@@ -12988,7 +13503,7 @@
 </p:sld>
 </file>
 
-<file path=ppt/slides/slide24.xml><?xml version="1.0" encoding="utf-8"?>
+<file path=ppt/slides/slide25.xml><?xml version="1.0" encoding="utf-8"?>
 <p:sld xmlns:a="http://schemas.openxmlformats.org/drawingml/2006/main" xmlns:r="http://schemas.openxmlformats.org/officeDocument/2006/relationships" xmlns:p="http://schemas.openxmlformats.org/presentationml/2006/main">
   <p:cSld>
     <p:spTree>
@@ -13389,7 +13904,7 @@
                   <a:spcPct val="100000"/>
                 </a:lnSpc>
               </a:pPr>
-              <a:t>24</a:t>
+              <a:t>25</a:t>
             </a:fld>
             <a:endParaRPr dirty="0">
               <a:solidFill>
@@ -13412,7 +13927,7 @@
 </p:sld>
 </file>
 
-<file path=ppt/slides/slide25.xml><?xml version="1.0" encoding="utf-8"?>
+<file path=ppt/slides/slide26.xml><?xml version="1.0" encoding="utf-8"?>
 <p:sld xmlns:a="http://schemas.openxmlformats.org/drawingml/2006/main" xmlns:r="http://schemas.openxmlformats.org/officeDocument/2006/relationships" xmlns:p="http://schemas.openxmlformats.org/presentationml/2006/main">
   <p:cSld>
     <p:spTree>
@@ -13620,7 +14135,7 @@
                   <a:spcPct val="100000"/>
                 </a:lnSpc>
               </a:pPr>
-              <a:t>25</a:t>
+              <a:t>26</a:t>
             </a:fld>
             <a:endParaRPr dirty="0">
               <a:solidFill>
@@ -13723,7 +14238,7 @@
 </p:sld>
 </file>
 
-<file path=ppt/slides/slide26.xml><?xml version="1.0" encoding="utf-8"?>
+<file path=ppt/slides/slide27.xml><?xml version="1.0" encoding="utf-8"?>
 <p:sld xmlns:a="http://schemas.openxmlformats.org/drawingml/2006/main" xmlns:r="http://schemas.openxmlformats.org/officeDocument/2006/relationships" xmlns:p="http://schemas.openxmlformats.org/presentationml/2006/main">
   <p:cSld>
     <p:spTree>
@@ -13975,7 +14490,7 @@
                   <a:spcPct val="100000"/>
                 </a:lnSpc>
               </a:pPr>
-              <a:t>26</a:t>
+              <a:t>27</a:t>
             </a:fld>
             <a:endParaRPr dirty="0">
               <a:solidFill>
@@ -14967,7 +15482,7 @@
 </p:sld>
 </file>
 
-<file path=ppt/slides/slide27.xml><?xml version="1.0" encoding="utf-8"?>
+<file path=ppt/slides/slide28.xml><?xml version="1.0" encoding="utf-8"?>
 <p:sld xmlns:a="http://schemas.openxmlformats.org/drawingml/2006/main" xmlns:r="http://schemas.openxmlformats.org/officeDocument/2006/relationships" xmlns:p="http://schemas.openxmlformats.org/presentationml/2006/main">
   <p:cSld>
     <p:spTree>
@@ -15209,7 +15724,7 @@
                   <a:spcPct val="100000"/>
                 </a:lnSpc>
               </a:pPr>
-              <a:t>27</a:t>
+              <a:t>28</a:t>
             </a:fld>
             <a:endParaRPr dirty="0">
               <a:solidFill>
@@ -16909,7 +17424,7 @@
 </p:sld>
 </file>
 
-<file path=ppt/slides/slide28.xml><?xml version="1.0" encoding="utf-8"?>
+<file path=ppt/slides/slide29.xml><?xml version="1.0" encoding="utf-8"?>
 <p:sld xmlns:a="http://schemas.openxmlformats.org/drawingml/2006/main" xmlns:r="http://schemas.openxmlformats.org/officeDocument/2006/relationships" xmlns:p="http://schemas.openxmlformats.org/presentationml/2006/main">
   <p:cSld>
     <p:spTree>
@@ -17107,7 +17622,7 @@
                   <a:spcPct val="100000"/>
                 </a:lnSpc>
               </a:pPr>
-              <a:t>28</a:t>
+              <a:t>29</a:t>
             </a:fld>
             <a:endParaRPr dirty="0">
               <a:solidFill>
@@ -17201,451 +17716,6 @@
     <p:extLst>
       <p:ext uri="{BB962C8B-B14F-4D97-AF65-F5344CB8AC3E}">
         <p14:creationId xmlns:p14="http://schemas.microsoft.com/office/powerpoint/2010/main" val="3623456062"/>
-      </p:ext>
-    </p:extLst>
-  </p:cSld>
-  <p:clrMapOvr>
-    <a:masterClrMapping/>
-  </p:clrMapOvr>
-</p:sld>
-</file>
-
-<file path=ppt/slides/slide29.xml><?xml version="1.0" encoding="utf-8"?>
-<p:sld xmlns:a="http://schemas.openxmlformats.org/drawingml/2006/main" xmlns:r="http://schemas.openxmlformats.org/officeDocument/2006/relationships" xmlns:p="http://schemas.openxmlformats.org/presentationml/2006/main">
-  <p:cSld>
-    <p:spTree>
-      <p:nvGrpSpPr>
-        <p:cNvPr id="1" name=""/>
-        <p:cNvGrpSpPr/>
-        <p:nvPr/>
-      </p:nvGrpSpPr>
-      <p:grpSpPr>
-        <a:xfrm>
-          <a:off x="0" y="0"/>
-          <a:ext cx="0" cy="0"/>
-          <a:chOff x="0" y="0"/>
-          <a:chExt cx="0" cy="0"/>
-        </a:xfrm>
-      </p:grpSpPr>
-      <p:sp>
-        <p:nvSpPr>
-          <p:cNvPr id="2" name="object 2"/>
-          <p:cNvSpPr txBox="1"/>
-          <p:nvPr/>
-        </p:nvSpPr>
-        <p:spPr>
-          <a:xfrm>
-            <a:off x="150678" y="216496"/>
-            <a:ext cx="1659255" cy="492443"/>
-          </a:xfrm>
-          <a:prstGeom prst="rect">
-            <a:avLst/>
-          </a:prstGeom>
-        </p:spPr>
-        <p:txBody>
-          <a:bodyPr vert="horz" wrap="square" lIns="0" tIns="0" rIns="0" bIns="0" rtlCol="0">
-            <a:spAutoFit/>
-          </a:bodyPr>
-          <a:lstStyle/>
-          <a:p>
-            <a:pPr marL="12700" marR="5080">
-              <a:lnSpc>
-                <a:spcPct val="100000"/>
-              </a:lnSpc>
-            </a:pPr>
-            <a:r>
-              <a:rPr lang="en-US" sz="1600" spc="-10" dirty="0">
-                <a:solidFill>
-                  <a:srgbClr val="FFFFFF"/>
-                </a:solidFill>
-                <a:latin typeface="Arial"/>
-                <a:cs typeface="Arial"/>
-              </a:rPr>
-              <a:t>Python 3 Beginner</a:t>
-            </a:r>
-            <a:endParaRPr sz="1600" dirty="0">
-              <a:latin typeface="Arial"/>
-              <a:cs typeface="Arial"/>
-            </a:endParaRPr>
-          </a:p>
-        </p:txBody>
-      </p:sp>
-      <p:sp>
-        <p:nvSpPr>
-          <p:cNvPr id="3" name="object 3"/>
-          <p:cNvSpPr txBox="1">
-            <a:spLocks noGrp="1"/>
-          </p:cNvSpPr>
-          <p:nvPr>
-            <p:ph type="title"/>
-          </p:nvPr>
-        </p:nvSpPr>
-        <p:spPr>
-          <a:xfrm>
-            <a:off x="782953" y="378886"/>
-            <a:ext cx="10626093" cy="384721"/>
-          </a:xfrm>
-          <a:prstGeom prst="rect">
-            <a:avLst/>
-          </a:prstGeom>
-        </p:spPr>
-        <p:txBody>
-          <a:bodyPr vert="horz" wrap="square" lIns="0" tIns="0" rIns="0" bIns="0" rtlCol="0">
-            <a:spAutoFit/>
-          </a:bodyPr>
-          <a:lstStyle/>
-          <a:p>
-            <a:pPr marL="1564640">
-              <a:lnSpc>
-                <a:spcPct val="100000"/>
-              </a:lnSpc>
-            </a:pPr>
-            <a:r>
-              <a:rPr lang="en-US" spc="-15" dirty="0"/>
-              <a:t>The </a:t>
-            </a:r>
-            <a:r>
-              <a:rPr lang="en-US" spc="-15" dirty="0" err="1">
-                <a:latin typeface="Consolas" panose="020B0609020204030204" pitchFamily="49" charset="0"/>
-                <a:cs typeface="Consolas" panose="020B0609020204030204" pitchFamily="49" charset="0"/>
-              </a:rPr>
-              <a:t>str</a:t>
-            </a:r>
-            <a:r>
-              <a:rPr lang="en-US" spc="-15" dirty="0"/>
-              <a:t> type</a:t>
-            </a:r>
-            <a:endParaRPr spc="-15" dirty="0"/>
-          </a:p>
-        </p:txBody>
-      </p:sp>
-      <p:sp>
-        <p:nvSpPr>
-          <p:cNvPr id="4" name="object 4"/>
-          <p:cNvSpPr txBox="1">
-            <a:spLocks noGrp="1"/>
-          </p:cNvSpPr>
-          <p:nvPr>
-            <p:ph type="body" idx="1"/>
-          </p:nvPr>
-        </p:nvSpPr>
-        <p:spPr>
-          <a:xfrm>
-            <a:off x="693418" y="1287703"/>
-            <a:ext cx="10805163" cy="3674980"/>
-          </a:xfrm>
-          <a:prstGeom prst="rect">
-            <a:avLst/>
-          </a:prstGeom>
-        </p:spPr>
-        <p:txBody>
-          <a:bodyPr vert="horz" wrap="square" lIns="0" tIns="0" rIns="0" bIns="0" rtlCol="0">
-            <a:spAutoFit/>
-          </a:bodyPr>
-          <a:lstStyle/>
-          <a:p>
-            <a:pPr marL="2044700" marR="5080" indent="-390525">
-              <a:lnSpc>
-                <a:spcPct val="150000"/>
-              </a:lnSpc>
-              <a:spcBef>
-                <a:spcPts val="805"/>
-              </a:spcBef>
-              <a:buFont typeface="Zapf Dingbats"/>
-              <a:buChar char="➠"/>
-            </a:pPr>
-            <a:r>
-              <a:rPr lang="en" sz="2400" dirty="0">
-                <a:latin typeface="Arial" panose="020B0604020202020204" pitchFamily="34" charset="0"/>
-                <a:cs typeface="Arial" panose="020B0604020202020204" pitchFamily="34" charset="0"/>
-              </a:rPr>
-              <a:t>The </a:t>
-            </a:r>
-            <a:r>
-              <a:rPr lang="en" sz="2400" dirty="0" err="1">
-                <a:latin typeface="Consolas" panose="020B0609020204030204" pitchFamily="49" charset="0"/>
-                <a:cs typeface="Consolas" panose="020B0609020204030204" pitchFamily="49" charset="0"/>
-              </a:rPr>
-              <a:t>str</a:t>
-            </a:r>
-            <a:r>
-              <a:rPr lang="en" sz="2400" dirty="0">
-                <a:latin typeface="Arial" panose="020B0604020202020204" pitchFamily="34" charset="0"/>
-                <a:cs typeface="Arial" panose="020B0604020202020204" pitchFamily="34" charset="0"/>
-              </a:rPr>
-              <a:t> type has many methods.</a:t>
-            </a:r>
-          </a:p>
-          <a:p>
-            <a:pPr marL="2044700" marR="5080" indent="-390525">
-              <a:lnSpc>
-                <a:spcPct val="150000"/>
-              </a:lnSpc>
-              <a:spcBef>
-                <a:spcPts val="805"/>
-              </a:spcBef>
-              <a:buFont typeface="Zapf Dingbats"/>
-              <a:buChar char="➠"/>
-            </a:pPr>
-            <a:r>
-              <a:rPr lang="en" sz="2400" dirty="0">
-                <a:latin typeface="Arial" panose="020B0604020202020204" pitchFamily="34" charset="0"/>
-                <a:cs typeface="Arial" panose="020B0604020202020204" pitchFamily="34" charset="0"/>
-              </a:rPr>
-              <a:t>A method is “something that the variable can perform” (a </a:t>
-            </a:r>
-            <a:r>
-              <a:rPr lang="en" sz="2400" i="1" dirty="0">
-                <a:latin typeface="Arial" panose="020B0604020202020204" pitchFamily="34" charset="0"/>
-                <a:cs typeface="Arial" panose="020B0604020202020204" pitchFamily="34" charset="0"/>
-              </a:rPr>
-              <a:t>function</a:t>
-            </a:r>
-            <a:r>
-              <a:rPr lang="en" sz="2400" dirty="0">
-                <a:latin typeface="Arial" panose="020B0604020202020204" pitchFamily="34" charset="0"/>
-                <a:cs typeface="Arial" panose="020B0604020202020204" pitchFamily="34" charset="0"/>
-              </a:rPr>
-              <a:t> bound to an </a:t>
-            </a:r>
-            <a:r>
-              <a:rPr lang="en" sz="2400" i="1" dirty="0">
-                <a:latin typeface="Arial" panose="020B0604020202020204" pitchFamily="34" charset="0"/>
-                <a:cs typeface="Arial" panose="020B0604020202020204" pitchFamily="34" charset="0"/>
-              </a:rPr>
-              <a:t>object</a:t>
-            </a:r>
-            <a:r>
-              <a:rPr lang="en" sz="2400" dirty="0">
-                <a:latin typeface="Arial" panose="020B0604020202020204" pitchFamily="34" charset="0"/>
-                <a:cs typeface="Arial" panose="020B0604020202020204" pitchFamily="34" charset="0"/>
-              </a:rPr>
-              <a:t>).</a:t>
-            </a:r>
-          </a:p>
-          <a:p>
-            <a:pPr marL="2044700" marR="5080" indent="-390525">
-              <a:lnSpc>
-                <a:spcPct val="150000"/>
-              </a:lnSpc>
-              <a:spcBef>
-                <a:spcPts val="805"/>
-              </a:spcBef>
-              <a:buFont typeface="Zapf Dingbats"/>
-              <a:buChar char="➠"/>
-            </a:pPr>
-            <a:r>
-              <a:rPr lang="en" sz="2400" dirty="0">
-                <a:latin typeface="Arial" panose="020B0604020202020204" pitchFamily="34" charset="0"/>
-                <a:cs typeface="Arial" panose="020B0604020202020204" pitchFamily="34" charset="0"/>
-              </a:rPr>
-              <a:t>Change casing: </a:t>
-            </a:r>
-            <a:r>
-              <a:rPr lang="en" sz="2400" dirty="0">
-                <a:latin typeface="Consolas" panose="020B0609020204030204" pitchFamily="49" charset="0"/>
-                <a:cs typeface="Consolas" panose="020B0609020204030204" pitchFamily="49" charset="0"/>
-              </a:rPr>
-              <a:t>upper</a:t>
-            </a:r>
-            <a:r>
-              <a:rPr lang="en" sz="2400" dirty="0">
-                <a:latin typeface="Arial" panose="020B0604020202020204" pitchFamily="34" charset="0"/>
-                <a:cs typeface="Arial" panose="020B0604020202020204" pitchFamily="34" charset="0"/>
-              </a:rPr>
-              <a:t>, </a:t>
-            </a:r>
-            <a:r>
-              <a:rPr lang="en" sz="2400" dirty="0">
-                <a:latin typeface="Consolas" panose="020B0609020204030204" pitchFamily="49" charset="0"/>
-                <a:cs typeface="Consolas" panose="020B0609020204030204" pitchFamily="49" charset="0"/>
-              </a:rPr>
-              <a:t>lower</a:t>
-            </a:r>
-            <a:r>
-              <a:rPr lang="en" sz="2400" dirty="0">
-                <a:latin typeface="Arial" panose="020B0604020202020204" pitchFamily="34" charset="0"/>
-                <a:cs typeface="Arial" panose="020B0604020202020204" pitchFamily="34" charset="0"/>
-              </a:rPr>
-              <a:t>, </a:t>
-            </a:r>
-            <a:r>
-              <a:rPr lang="en" sz="2400" dirty="0">
-                <a:latin typeface="Consolas" panose="020B0609020204030204" pitchFamily="49" charset="0"/>
-                <a:cs typeface="Consolas" panose="020B0609020204030204" pitchFamily="49" charset="0"/>
-              </a:rPr>
-              <a:t>title</a:t>
-            </a:r>
-          </a:p>
-          <a:p>
-            <a:pPr marL="2044700" marR="5080" indent="-390525">
-              <a:lnSpc>
-                <a:spcPct val="150000"/>
-              </a:lnSpc>
-              <a:spcBef>
-                <a:spcPts val="805"/>
-              </a:spcBef>
-              <a:buFont typeface="Zapf Dingbats"/>
-              <a:buChar char="➠"/>
-            </a:pPr>
-            <a:r>
-              <a:rPr lang="en" sz="2400" dirty="0">
-                <a:latin typeface="Arial" panose="020B0604020202020204" pitchFamily="34" charset="0"/>
-                <a:cs typeface="Arial" panose="020B0604020202020204" pitchFamily="34" charset="0"/>
-              </a:rPr>
-              <a:t>Change whitespace: </a:t>
-            </a:r>
-            <a:r>
-              <a:rPr lang="en" sz="2400" dirty="0">
-                <a:latin typeface="Consolas" panose="020B0609020204030204" pitchFamily="49" charset="0"/>
-                <a:cs typeface="Consolas" panose="020B0609020204030204" pitchFamily="49" charset="0"/>
-              </a:rPr>
-              <a:t>strip</a:t>
-            </a:r>
-          </a:p>
-          <a:p>
-            <a:pPr marL="2044700" marR="5080" indent="-390525">
-              <a:lnSpc>
-                <a:spcPct val="150000"/>
-              </a:lnSpc>
-              <a:spcBef>
-                <a:spcPts val="805"/>
-              </a:spcBef>
-              <a:buFont typeface="Zapf Dingbats"/>
-              <a:buChar char="➠"/>
-            </a:pPr>
-            <a:r>
-              <a:rPr lang="en" sz="2400" dirty="0">
-                <a:latin typeface="Arial" panose="020B0604020202020204" pitchFamily="34" charset="0"/>
-                <a:cs typeface="Arial" panose="020B0604020202020204" pitchFamily="34" charset="0"/>
-              </a:rPr>
-              <a:t>Extract words: </a:t>
-            </a:r>
-            <a:r>
-              <a:rPr lang="en" sz="2400" dirty="0">
-                <a:latin typeface="Consolas" panose="020B0609020204030204" pitchFamily="49" charset="0"/>
-                <a:cs typeface="Consolas" panose="020B0609020204030204" pitchFamily="49" charset="0"/>
-              </a:rPr>
-              <a:t>split</a:t>
-            </a:r>
-          </a:p>
-        </p:txBody>
-      </p:sp>
-      <p:sp>
-        <p:nvSpPr>
-          <p:cNvPr id="7" name="Holder 6">
-            <a:extLst>
-              <a:ext uri="{FF2B5EF4-FFF2-40B4-BE49-F238E27FC236}">
-                <a16:creationId xmlns:a16="http://schemas.microsoft.com/office/drawing/2014/main" id="{278BF67D-BD17-4CD4-9C6F-CA2F6A282BE9}"/>
-              </a:ext>
-            </a:extLst>
-          </p:cNvPr>
-          <p:cNvSpPr>
-            <a:spLocks noGrp="1"/>
-          </p:cNvSpPr>
-          <p:nvPr>
-            <p:ph type="sldNum" sz="quarter" idx="7"/>
-          </p:nvPr>
-        </p:nvSpPr>
-        <p:spPr>
-          <a:xfrm>
-            <a:off x="10363205" y="6629400"/>
-            <a:ext cx="1573026" cy="123111"/>
-          </a:xfrm>
-          <a:prstGeom prst="rect">
-            <a:avLst/>
-          </a:prstGeom>
-        </p:spPr>
-        <p:txBody>
-          <a:bodyPr wrap="square" lIns="0" tIns="0" rIns="0" bIns="0">
-            <a:spAutoFit/>
-          </a:bodyPr>
-          <a:lstStyle>
-            <a:lvl1pPr>
-              <a:defRPr sz="800" b="0" i="0">
-                <a:solidFill>
-                  <a:srgbClr val="A4A4A4"/>
-                </a:solidFill>
-                <a:latin typeface="Arial"/>
-                <a:cs typeface="Arial"/>
-              </a:defRPr>
-            </a:lvl1pPr>
-          </a:lstStyle>
-          <a:p>
-            <a:pPr marL="12700">
-              <a:lnSpc>
-                <a:spcPct val="100000"/>
-              </a:lnSpc>
-            </a:pPr>
-            <a:r>
-              <a:rPr lang="fr-FR" spc="-5" dirty="0"/>
-              <a:t>Cop</a:t>
-            </a:r>
-            <a:r>
-              <a:rPr lang="fr-FR" spc="-10" dirty="0"/>
-              <a:t>y</a:t>
-            </a:r>
-            <a:r>
-              <a:rPr lang="fr-FR" spc="-5" dirty="0"/>
-              <a:t>r</a:t>
-            </a:r>
-            <a:r>
-              <a:rPr lang="fr-FR" dirty="0"/>
-              <a:t>ig</a:t>
-            </a:r>
-            <a:r>
-              <a:rPr lang="fr-FR" spc="-5" dirty="0"/>
-              <a:t>h</a:t>
-            </a:r>
-            <a:r>
-              <a:rPr lang="fr-FR" dirty="0"/>
-              <a:t>t</a:t>
-            </a:r>
-            <a:r>
-              <a:rPr lang="fr-FR" spc="20" dirty="0"/>
-              <a:t> </a:t>
-            </a:r>
-            <a:r>
-              <a:rPr lang="fr-FR" dirty="0"/>
-              <a:t>© </a:t>
-            </a:r>
-            <a:r>
-              <a:rPr lang="fr-FR" spc="-5" dirty="0"/>
-              <a:t>2020</a:t>
-            </a:r>
-            <a:r>
-              <a:rPr lang="fr-FR" dirty="0"/>
-              <a:t>  </a:t>
-            </a:r>
-            <a:r>
-              <a:rPr lang="fr-FR" spc="95" dirty="0"/>
-              <a:t> </a:t>
-            </a:r>
-            <a:fld id="{81D60167-4931-47E6-BA6A-407CBD079E47}" type="slidenum">
-              <a:rPr smtClean="0">
-                <a:solidFill>
-                  <a:srgbClr val="000000"/>
-                </a:solidFill>
-              </a:rPr>
-              <a:pPr marL="12700">
-                <a:lnSpc>
-                  <a:spcPct val="100000"/>
-                </a:lnSpc>
-              </a:pPr>
-              <a:t>29</a:t>
-            </a:fld>
-            <a:endParaRPr dirty="0">
-              <a:solidFill>
-                <a:srgbClr val="000000"/>
-              </a:solidFill>
-            </a:endParaRPr>
-          </a:p>
-        </p:txBody>
-      </p:sp>
-    </p:spTree>
-    <p:extLst>
-      <p:ext uri="{BB962C8B-B14F-4D97-AF65-F5344CB8AC3E}">
-        <p14:creationId xmlns:p14="http://schemas.microsoft.com/office/powerpoint/2010/main" val="3337788344"/>
       </p:ext>
     </p:extLst>
   </p:cSld>
@@ -18325,7 +18395,18 @@
             </a:pPr>
             <a:r>
               <a:rPr lang="en-US" spc="-15" dirty="0"/>
-              <a:t>Type conversions</a:t>
+              <a:t>The </a:t>
+            </a:r>
+            <a:r>
+              <a:rPr lang="en-US" spc="-15" dirty="0" err="1">
+                <a:latin typeface="Consolas" panose="020B0609020204030204" pitchFamily="49" charset="0"/>
+                <a:cs typeface="Consolas" panose="020B0609020204030204" pitchFamily="49" charset="0"/>
+              </a:rPr>
+              <a:t>str</a:t>
+            </a:r>
+            <a:r>
+              <a:rPr lang="en-US" spc="-15" dirty="0"/>
+              <a:t> type</a:t>
             </a:r>
             <a:endParaRPr spc="-15" dirty="0"/>
           </a:p>
@@ -18344,7 +18425,7 @@
         <p:spPr>
           <a:xfrm>
             <a:off x="693418" y="1287703"/>
-            <a:ext cx="10805163" cy="1696105"/>
+            <a:ext cx="10805163" cy="3674980"/>
           </a:xfrm>
           <a:prstGeom prst="rect">
             <a:avLst/>
@@ -18371,7 +18452,21 @@
                 <a:latin typeface="Arial" panose="020B0604020202020204" pitchFamily="34" charset="0"/>
                 <a:cs typeface="Arial" panose="020B0604020202020204" pitchFamily="34" charset="0"/>
               </a:rPr>
-              <a:t>A type can sometimes be converted to another type.</a:t>
+              <a:t>The </a:t>
+            </a:r>
+            <a:r>
+              <a:rPr lang="en" sz="2400" dirty="0" err="1">
+                <a:latin typeface="Consolas" panose="020B0609020204030204" pitchFamily="49" charset="0"/>
+                <a:cs typeface="Consolas" panose="020B0609020204030204" pitchFamily="49" charset="0"/>
+              </a:rPr>
+              <a:t>str</a:t>
+            </a:r>
+            <a:r>
+              <a:rPr lang="en" sz="2400" dirty="0">
+                <a:latin typeface="Arial" panose="020B0604020202020204" pitchFamily="34" charset="0"/>
+                <a:cs typeface="Arial" panose="020B0604020202020204" pitchFamily="34" charset="0"/>
+              </a:rPr>
+              <a:t> type has many methods.</a:t>
             </a:r>
           </a:p>
           <a:p>
@@ -18390,7 +18485,141 @@
                 <a:latin typeface="Arial" panose="020B0604020202020204" pitchFamily="34" charset="0"/>
                 <a:cs typeface="Arial" panose="020B0604020202020204" pitchFamily="34" charset="0"/>
               </a:rPr>
-              <a:t>Write the type name, followed by the value between parentheses:</a:t>
+              <a:t>A method is “something that the variable can perform” (a </a:t>
+            </a:r>
+            <a:r>
+              <a:rPr lang="en" sz="2400" i="1" dirty="0">
+                <a:latin typeface="Arial" panose="020B0604020202020204" pitchFamily="34" charset="0"/>
+                <a:cs typeface="Arial" panose="020B0604020202020204" pitchFamily="34" charset="0"/>
+              </a:rPr>
+              <a:t>function</a:t>
+            </a:r>
+            <a:r>
+              <a:rPr lang="en" sz="2400" dirty="0">
+                <a:latin typeface="Arial" panose="020B0604020202020204" pitchFamily="34" charset="0"/>
+                <a:cs typeface="Arial" panose="020B0604020202020204" pitchFamily="34" charset="0"/>
+              </a:rPr>
+              <a:t> bound to an </a:t>
+            </a:r>
+            <a:r>
+              <a:rPr lang="en" sz="2400" i="1" dirty="0">
+                <a:latin typeface="Arial" panose="020B0604020202020204" pitchFamily="34" charset="0"/>
+                <a:cs typeface="Arial" panose="020B0604020202020204" pitchFamily="34" charset="0"/>
+              </a:rPr>
+              <a:t>object</a:t>
+            </a:r>
+            <a:r>
+              <a:rPr lang="en" sz="2400" dirty="0">
+                <a:latin typeface="Arial" panose="020B0604020202020204" pitchFamily="34" charset="0"/>
+                <a:cs typeface="Arial" panose="020B0604020202020204" pitchFamily="34" charset="0"/>
+              </a:rPr>
+              <a:t>).</a:t>
+            </a:r>
+          </a:p>
+          <a:p>
+            <a:pPr marL="2044700" marR="5080" indent="-390525">
+              <a:lnSpc>
+                <a:spcPct val="150000"/>
+              </a:lnSpc>
+              <a:spcBef>
+                <a:spcPts val="805"/>
+              </a:spcBef>
+              <a:buFont typeface="Zapf Dingbats"/>
+              <a:buChar char="➠"/>
+            </a:pPr>
+            <a:r>
+              <a:rPr lang="en" sz="2400" dirty="0">
+                <a:latin typeface="Arial" panose="020B0604020202020204" pitchFamily="34" charset="0"/>
+                <a:cs typeface="Arial" panose="020B0604020202020204" pitchFamily="34" charset="0"/>
+              </a:rPr>
+              <a:t>Change casing: </a:t>
+            </a:r>
+            <a:r>
+              <a:rPr lang="en" sz="2400" dirty="0">
+                <a:latin typeface="Consolas" panose="020B0609020204030204" pitchFamily="49" charset="0"/>
+                <a:cs typeface="Consolas" panose="020B0609020204030204" pitchFamily="49" charset="0"/>
+              </a:rPr>
+              <a:t>upper</a:t>
+            </a:r>
+            <a:r>
+              <a:rPr lang="en" sz="2400" dirty="0">
+                <a:latin typeface="Arial" panose="020B0604020202020204" pitchFamily="34" charset="0"/>
+                <a:cs typeface="Arial" panose="020B0604020202020204" pitchFamily="34" charset="0"/>
+              </a:rPr>
+              <a:t>, </a:t>
+            </a:r>
+            <a:r>
+              <a:rPr lang="en" sz="2400" dirty="0">
+                <a:latin typeface="Consolas" panose="020B0609020204030204" pitchFamily="49" charset="0"/>
+                <a:cs typeface="Consolas" panose="020B0609020204030204" pitchFamily="49" charset="0"/>
+              </a:rPr>
+              <a:t>lower</a:t>
+            </a:r>
+            <a:r>
+              <a:rPr lang="en" sz="2400" dirty="0">
+                <a:latin typeface="Arial" panose="020B0604020202020204" pitchFamily="34" charset="0"/>
+                <a:cs typeface="Arial" panose="020B0604020202020204" pitchFamily="34" charset="0"/>
+              </a:rPr>
+              <a:t>, </a:t>
+            </a:r>
+            <a:r>
+              <a:rPr lang="en" sz="2400" dirty="0">
+                <a:latin typeface="Consolas" panose="020B0609020204030204" pitchFamily="49" charset="0"/>
+                <a:cs typeface="Consolas" panose="020B0609020204030204" pitchFamily="49" charset="0"/>
+              </a:rPr>
+              <a:t>title</a:t>
+            </a:r>
+          </a:p>
+          <a:p>
+            <a:pPr marL="2044700" marR="5080" indent="-390525">
+              <a:lnSpc>
+                <a:spcPct val="150000"/>
+              </a:lnSpc>
+              <a:spcBef>
+                <a:spcPts val="805"/>
+              </a:spcBef>
+              <a:buFont typeface="Zapf Dingbats"/>
+              <a:buChar char="➠"/>
+            </a:pPr>
+            <a:r>
+              <a:rPr lang="en" sz="2400" dirty="0">
+                <a:latin typeface="Arial" panose="020B0604020202020204" pitchFamily="34" charset="0"/>
+                <a:cs typeface="Arial" panose="020B0604020202020204" pitchFamily="34" charset="0"/>
+              </a:rPr>
+              <a:t>Change whitespace: </a:t>
+            </a:r>
+            <a:r>
+              <a:rPr lang="en" sz="2400" dirty="0">
+                <a:latin typeface="Consolas" panose="020B0609020204030204" pitchFamily="49" charset="0"/>
+                <a:cs typeface="Consolas" panose="020B0609020204030204" pitchFamily="49" charset="0"/>
+              </a:rPr>
+              <a:t>strip</a:t>
+            </a:r>
+          </a:p>
+          <a:p>
+            <a:pPr marL="2044700" marR="5080" indent="-390525">
+              <a:lnSpc>
+                <a:spcPct val="150000"/>
+              </a:lnSpc>
+              <a:spcBef>
+                <a:spcPts val="805"/>
+              </a:spcBef>
+              <a:buFont typeface="Zapf Dingbats"/>
+              <a:buChar char="➠"/>
+            </a:pPr>
+            <a:r>
+              <a:rPr lang="en" sz="2400" dirty="0">
+                <a:latin typeface="Arial" panose="020B0604020202020204" pitchFamily="34" charset="0"/>
+                <a:cs typeface="Arial" panose="020B0604020202020204" pitchFamily="34" charset="0"/>
+              </a:rPr>
+              <a:t>Extract words: </a:t>
+            </a:r>
+            <a:r>
+              <a:rPr lang="en" sz="2400" dirty="0">
+                <a:latin typeface="Consolas" panose="020B0609020204030204" pitchFamily="49" charset="0"/>
+                <a:cs typeface="Consolas" panose="020B0609020204030204" pitchFamily="49" charset="0"/>
+              </a:rPr>
+              <a:t>split</a:t>
             </a:r>
           </a:p>
         </p:txBody>
@@ -18497,6 +18726,292 @@
                 </a:lnSpc>
               </a:pPr>
               <a:t>30</a:t>
+            </a:fld>
+            <a:endParaRPr dirty="0">
+              <a:solidFill>
+                <a:srgbClr val="000000"/>
+              </a:solidFill>
+            </a:endParaRPr>
+          </a:p>
+        </p:txBody>
+      </p:sp>
+    </p:spTree>
+    <p:extLst>
+      <p:ext uri="{BB962C8B-B14F-4D97-AF65-F5344CB8AC3E}">
+        <p14:creationId xmlns:p14="http://schemas.microsoft.com/office/powerpoint/2010/main" val="3337788344"/>
+      </p:ext>
+    </p:extLst>
+  </p:cSld>
+  <p:clrMapOvr>
+    <a:masterClrMapping/>
+  </p:clrMapOvr>
+</p:sld>
+</file>
+
+<file path=ppt/slides/slide31.xml><?xml version="1.0" encoding="utf-8"?>
+<p:sld xmlns:a="http://schemas.openxmlformats.org/drawingml/2006/main" xmlns:r="http://schemas.openxmlformats.org/officeDocument/2006/relationships" xmlns:p="http://schemas.openxmlformats.org/presentationml/2006/main">
+  <p:cSld>
+    <p:spTree>
+      <p:nvGrpSpPr>
+        <p:cNvPr id="1" name=""/>
+        <p:cNvGrpSpPr/>
+        <p:nvPr/>
+      </p:nvGrpSpPr>
+      <p:grpSpPr>
+        <a:xfrm>
+          <a:off x="0" y="0"/>
+          <a:ext cx="0" cy="0"/>
+          <a:chOff x="0" y="0"/>
+          <a:chExt cx="0" cy="0"/>
+        </a:xfrm>
+      </p:grpSpPr>
+      <p:sp>
+        <p:nvSpPr>
+          <p:cNvPr id="2" name="object 2"/>
+          <p:cNvSpPr txBox="1"/>
+          <p:nvPr/>
+        </p:nvSpPr>
+        <p:spPr>
+          <a:xfrm>
+            <a:off x="150678" y="216496"/>
+            <a:ext cx="1659255" cy="492443"/>
+          </a:xfrm>
+          <a:prstGeom prst="rect">
+            <a:avLst/>
+          </a:prstGeom>
+        </p:spPr>
+        <p:txBody>
+          <a:bodyPr vert="horz" wrap="square" lIns="0" tIns="0" rIns="0" bIns="0" rtlCol="0">
+            <a:spAutoFit/>
+          </a:bodyPr>
+          <a:lstStyle/>
+          <a:p>
+            <a:pPr marL="12700" marR="5080">
+              <a:lnSpc>
+                <a:spcPct val="100000"/>
+              </a:lnSpc>
+            </a:pPr>
+            <a:r>
+              <a:rPr lang="en-US" sz="1600" spc="-10" dirty="0">
+                <a:solidFill>
+                  <a:srgbClr val="FFFFFF"/>
+                </a:solidFill>
+                <a:latin typeface="Arial"/>
+                <a:cs typeface="Arial"/>
+              </a:rPr>
+              <a:t>Python 3 Beginner</a:t>
+            </a:r>
+            <a:endParaRPr sz="1600" dirty="0">
+              <a:latin typeface="Arial"/>
+              <a:cs typeface="Arial"/>
+            </a:endParaRPr>
+          </a:p>
+        </p:txBody>
+      </p:sp>
+      <p:sp>
+        <p:nvSpPr>
+          <p:cNvPr id="3" name="object 3"/>
+          <p:cNvSpPr txBox="1">
+            <a:spLocks noGrp="1"/>
+          </p:cNvSpPr>
+          <p:nvPr>
+            <p:ph type="title"/>
+          </p:nvPr>
+        </p:nvSpPr>
+        <p:spPr>
+          <a:xfrm>
+            <a:off x="782953" y="378886"/>
+            <a:ext cx="10626093" cy="384721"/>
+          </a:xfrm>
+          <a:prstGeom prst="rect">
+            <a:avLst/>
+          </a:prstGeom>
+        </p:spPr>
+        <p:txBody>
+          <a:bodyPr vert="horz" wrap="square" lIns="0" tIns="0" rIns="0" bIns="0" rtlCol="0">
+            <a:spAutoFit/>
+          </a:bodyPr>
+          <a:lstStyle/>
+          <a:p>
+            <a:pPr marL="1564640">
+              <a:lnSpc>
+                <a:spcPct val="100000"/>
+              </a:lnSpc>
+            </a:pPr>
+            <a:r>
+              <a:rPr lang="en-US" spc="-15" dirty="0"/>
+              <a:t>Type conversions</a:t>
+            </a:r>
+            <a:endParaRPr spc="-15" dirty="0"/>
+          </a:p>
+        </p:txBody>
+      </p:sp>
+      <p:sp>
+        <p:nvSpPr>
+          <p:cNvPr id="4" name="object 4"/>
+          <p:cNvSpPr txBox="1">
+            <a:spLocks noGrp="1"/>
+          </p:cNvSpPr>
+          <p:nvPr>
+            <p:ph type="body" idx="1"/>
+          </p:nvPr>
+        </p:nvSpPr>
+        <p:spPr>
+          <a:xfrm>
+            <a:off x="693418" y="1287703"/>
+            <a:ext cx="10805163" cy="1696105"/>
+          </a:xfrm>
+          <a:prstGeom prst="rect">
+            <a:avLst/>
+          </a:prstGeom>
+        </p:spPr>
+        <p:txBody>
+          <a:bodyPr vert="horz" wrap="square" lIns="0" tIns="0" rIns="0" bIns="0" rtlCol="0">
+            <a:spAutoFit/>
+          </a:bodyPr>
+          <a:lstStyle/>
+          <a:p>
+            <a:pPr marL="2044700" marR="5080" indent="-390525">
+              <a:lnSpc>
+                <a:spcPct val="150000"/>
+              </a:lnSpc>
+              <a:spcBef>
+                <a:spcPts val="805"/>
+              </a:spcBef>
+              <a:buFont typeface="Zapf Dingbats"/>
+              <a:buChar char="➠"/>
+            </a:pPr>
+            <a:r>
+              <a:rPr lang="en" sz="2400" dirty="0">
+                <a:latin typeface="Arial" panose="020B0604020202020204" pitchFamily="34" charset="0"/>
+                <a:cs typeface="Arial" panose="020B0604020202020204" pitchFamily="34" charset="0"/>
+              </a:rPr>
+              <a:t>A type can sometimes be converted to another type.</a:t>
+            </a:r>
+          </a:p>
+          <a:p>
+            <a:pPr marL="2044700" marR="5080" indent="-390525">
+              <a:lnSpc>
+                <a:spcPct val="150000"/>
+              </a:lnSpc>
+              <a:spcBef>
+                <a:spcPts val="805"/>
+              </a:spcBef>
+              <a:buFont typeface="Zapf Dingbats"/>
+              <a:buChar char="➠"/>
+            </a:pPr>
+            <a:r>
+              <a:rPr lang="en" sz="2400" dirty="0">
+                <a:latin typeface="Arial" panose="020B0604020202020204" pitchFamily="34" charset="0"/>
+                <a:cs typeface="Arial" panose="020B0604020202020204" pitchFamily="34" charset="0"/>
+              </a:rPr>
+              <a:t>Write the type name, followed by the value between parentheses:</a:t>
+            </a:r>
+          </a:p>
+        </p:txBody>
+      </p:sp>
+      <p:sp>
+        <p:nvSpPr>
+          <p:cNvPr id="7" name="Holder 6">
+            <a:extLst>
+              <a:ext uri="{FF2B5EF4-FFF2-40B4-BE49-F238E27FC236}">
+                <a16:creationId xmlns:a16="http://schemas.microsoft.com/office/drawing/2014/main" id="{278BF67D-BD17-4CD4-9C6F-CA2F6A282BE9}"/>
+              </a:ext>
+            </a:extLst>
+          </p:cNvPr>
+          <p:cNvSpPr>
+            <a:spLocks noGrp="1"/>
+          </p:cNvSpPr>
+          <p:nvPr>
+            <p:ph type="sldNum" sz="quarter" idx="7"/>
+          </p:nvPr>
+        </p:nvSpPr>
+        <p:spPr>
+          <a:xfrm>
+            <a:off x="10363205" y="6629400"/>
+            <a:ext cx="1573026" cy="123111"/>
+          </a:xfrm>
+          <a:prstGeom prst="rect">
+            <a:avLst/>
+          </a:prstGeom>
+        </p:spPr>
+        <p:txBody>
+          <a:bodyPr wrap="square" lIns="0" tIns="0" rIns="0" bIns="0">
+            <a:spAutoFit/>
+          </a:bodyPr>
+          <a:lstStyle>
+            <a:lvl1pPr>
+              <a:defRPr sz="800" b="0" i="0">
+                <a:solidFill>
+                  <a:srgbClr val="A4A4A4"/>
+                </a:solidFill>
+                <a:latin typeface="Arial"/>
+                <a:cs typeface="Arial"/>
+              </a:defRPr>
+            </a:lvl1pPr>
+          </a:lstStyle>
+          <a:p>
+            <a:pPr marL="12700">
+              <a:lnSpc>
+                <a:spcPct val="100000"/>
+              </a:lnSpc>
+            </a:pPr>
+            <a:r>
+              <a:rPr lang="fr-FR" spc="-5" dirty="0"/>
+              <a:t>Cop</a:t>
+            </a:r>
+            <a:r>
+              <a:rPr lang="fr-FR" spc="-10" dirty="0"/>
+              <a:t>y</a:t>
+            </a:r>
+            <a:r>
+              <a:rPr lang="fr-FR" spc="-5" dirty="0"/>
+              <a:t>r</a:t>
+            </a:r>
+            <a:r>
+              <a:rPr lang="fr-FR" dirty="0"/>
+              <a:t>ig</a:t>
+            </a:r>
+            <a:r>
+              <a:rPr lang="fr-FR" spc="-5" dirty="0"/>
+              <a:t>h</a:t>
+            </a:r>
+            <a:r>
+              <a:rPr lang="fr-FR" dirty="0"/>
+              <a:t>t</a:t>
+            </a:r>
+            <a:r>
+              <a:rPr lang="fr-FR" spc="20" dirty="0"/>
+              <a:t> </a:t>
+            </a:r>
+            <a:r>
+              <a:rPr lang="fr-FR" dirty="0"/>
+              <a:t>© </a:t>
+            </a:r>
+            <a:r>
+              <a:rPr lang="fr-FR" spc="-5" dirty="0"/>
+              <a:t>2020</a:t>
+            </a:r>
+            <a:r>
+              <a:rPr lang="fr-FR" dirty="0"/>
+              <a:t>  </a:t>
+            </a:r>
+            <a:r>
+              <a:rPr lang="fr-FR" spc="95" dirty="0"/>
+              <a:t> </a:t>
+            </a:r>
+            <a:fld id="{81D60167-4931-47E6-BA6A-407CBD079E47}" type="slidenum">
+              <a:rPr smtClean="0">
+                <a:solidFill>
+                  <a:srgbClr val="000000"/>
+                </a:solidFill>
+              </a:rPr>
+              <a:pPr marL="12700">
+                <a:lnSpc>
+                  <a:spcPct val="100000"/>
+                </a:lnSpc>
+              </a:pPr>
+              <a:t>31</a:t>
             </a:fld>
             <a:endParaRPr dirty="0">
               <a:solidFill>
@@ -19021,7 +19536,7 @@
 </p:sld>
 </file>
 
-<file path=ppt/slides/slide31.xml><?xml version="1.0" encoding="utf-8"?>
+<file path=ppt/slides/slide32.xml><?xml version="1.0" encoding="utf-8"?>
 <p:sld xmlns:a="http://schemas.openxmlformats.org/drawingml/2006/main" xmlns:r="http://schemas.openxmlformats.org/officeDocument/2006/relationships" xmlns:p="http://schemas.openxmlformats.org/presentationml/2006/main">
   <p:cSld>
     <p:spTree>
@@ -19265,7 +19780,7 @@
                   <a:spcPct val="100000"/>
                 </a:lnSpc>
               </a:pPr>
-              <a:t>31</a:t>
+              <a:t>32</a:t>
             </a:fld>
             <a:endParaRPr dirty="0">
               <a:solidFill>
@@ -19900,7 +20415,7 @@
 </p:sld>
 </file>
 
-<file path=ppt/slides/slide32.xml><?xml version="1.0" encoding="utf-8"?>
+<file path=ppt/slides/slide33.xml><?xml version="1.0" encoding="utf-8"?>
 <p:sld xmlns:a="http://schemas.openxmlformats.org/drawingml/2006/main" xmlns:r="http://schemas.openxmlformats.org/officeDocument/2006/relationships" xmlns:p="http://schemas.openxmlformats.org/presentationml/2006/main">
   <p:cSld>
     <p:spTree>
@@ -20098,7 +20613,7 @@
                   <a:spcPct val="100000"/>
                 </a:lnSpc>
               </a:pPr>
-              <a:t>32</a:t>
+              <a:t>33</a:t>
             </a:fld>
             <a:endParaRPr dirty="0">
               <a:solidFill>
@@ -20201,7 +20716,7 @@
 </p:sld>
 </file>
 
-<file path=ppt/slides/slide33.xml><?xml version="1.0" encoding="utf-8"?>
+<file path=ppt/slides/slide34.xml><?xml version="1.0" encoding="utf-8"?>
 <p:sld xmlns:a="http://schemas.openxmlformats.org/drawingml/2006/main" xmlns:r="http://schemas.openxmlformats.org/officeDocument/2006/relationships" xmlns:p="http://schemas.openxmlformats.org/presentationml/2006/main">
   <p:cSld>
     <p:spTree>
@@ -20505,7 +21020,425 @@
 </p:sld>
 </file>
 
-<file path=ppt/slides/slide34.xml><?xml version="1.0" encoding="utf-8"?>
+<file path=ppt/slides/slide35.xml><?xml version="1.0" encoding="utf-8"?>
+<p:sld xmlns:a="http://schemas.openxmlformats.org/drawingml/2006/main" xmlns:r="http://schemas.openxmlformats.org/officeDocument/2006/relationships" xmlns:p="http://schemas.openxmlformats.org/presentationml/2006/main">
+  <p:cSld>
+    <p:spTree>
+      <p:nvGrpSpPr>
+        <p:cNvPr id="1" name=""/>
+        <p:cNvGrpSpPr/>
+        <p:nvPr/>
+      </p:nvGrpSpPr>
+      <p:grpSpPr>
+        <a:xfrm>
+          <a:off x="0" y="0"/>
+          <a:ext cx="0" cy="0"/>
+          <a:chOff x="0" y="0"/>
+          <a:chExt cx="0" cy="0"/>
+        </a:xfrm>
+      </p:grpSpPr>
+      <p:sp>
+        <p:nvSpPr>
+          <p:cNvPr id="3" name="object 3"/>
+          <p:cNvSpPr/>
+          <p:nvPr/>
+        </p:nvSpPr>
+        <p:spPr>
+          <a:xfrm>
+            <a:off x="1930907" y="1059178"/>
+            <a:ext cx="10261091" cy="5798821"/>
+          </a:xfrm>
+          <a:prstGeom prst="rect">
+            <a:avLst/>
+          </a:prstGeom>
+          <a:blipFill>
+            <a:blip r:embed="rId3" cstate="print"/>
+            <a:stretch>
+              <a:fillRect/>
+            </a:stretch>
+          </a:blipFill>
+        </p:spPr>
+        <p:txBody>
+          <a:bodyPr wrap="square" lIns="0" tIns="0" rIns="0" bIns="0" rtlCol="0"/>
+          <a:lstStyle/>
+          <a:p>
+            <a:endParaRPr/>
+          </a:p>
+        </p:txBody>
+      </p:sp>
+      <p:sp>
+        <p:nvSpPr>
+          <p:cNvPr id="4" name="object 4"/>
+          <p:cNvSpPr txBox="1">
+            <a:spLocks noGrp="1"/>
+          </p:cNvSpPr>
+          <p:nvPr>
+            <p:ph type="title"/>
+          </p:nvPr>
+        </p:nvSpPr>
+        <p:spPr>
+          <a:xfrm>
+            <a:off x="2209800" y="378886"/>
+            <a:ext cx="9199246" cy="384721"/>
+          </a:xfrm>
+          <a:prstGeom prst="rect">
+            <a:avLst/>
+          </a:prstGeom>
+        </p:spPr>
+        <p:txBody>
+          <a:bodyPr vert="horz" wrap="square" lIns="0" tIns="0" rIns="0" bIns="0" rtlCol="0">
+            <a:spAutoFit/>
+          </a:bodyPr>
+          <a:lstStyle/>
+          <a:p>
+            <a:pPr marL="1564640">
+              <a:lnSpc>
+                <a:spcPct val="100000"/>
+              </a:lnSpc>
+            </a:pPr>
+            <a:r>
+              <a:rPr lang="en-US" spc="-20" dirty="0"/>
+              <a:t>Chapter</a:t>
+            </a:r>
+            <a:r>
+              <a:rPr spc="-25" dirty="0"/>
+              <a:t> </a:t>
+            </a:r>
+            <a:r>
+              <a:rPr spc="-20" dirty="0"/>
+              <a:t>Summary</a:t>
+            </a:r>
+          </a:p>
+        </p:txBody>
+      </p:sp>
+      <p:sp>
+        <p:nvSpPr>
+          <p:cNvPr id="6" name="object 6"/>
+          <p:cNvSpPr txBox="1">
+            <a:spLocks noGrp="1"/>
+          </p:cNvSpPr>
+          <p:nvPr>
+            <p:ph type="sldNum" sz="quarter" idx="7"/>
+          </p:nvPr>
+        </p:nvSpPr>
+        <p:spPr>
+          <a:xfrm>
+            <a:off x="10864985" y="6661976"/>
+            <a:ext cx="1071245" cy="246221"/>
+          </a:xfrm>
+          <a:prstGeom prst="rect">
+            <a:avLst/>
+          </a:prstGeom>
+        </p:spPr>
+        <p:txBody>
+          <a:bodyPr vert="horz" wrap="square" lIns="0" tIns="0" rIns="0" bIns="0" rtlCol="0">
+            <a:spAutoFit/>
+          </a:bodyPr>
+          <a:lstStyle/>
+          <a:p>
+            <a:pPr marL="12700">
+              <a:lnSpc>
+                <a:spcPct val="100000"/>
+              </a:lnSpc>
+            </a:pPr>
+            <a:r>
+              <a:rPr spc="-5" dirty="0"/>
+              <a:t>Cop</a:t>
+            </a:r>
+            <a:r>
+              <a:rPr spc="-10" dirty="0"/>
+              <a:t>y</a:t>
+            </a:r>
+            <a:r>
+              <a:rPr spc="-5" dirty="0"/>
+              <a:t>r</a:t>
+            </a:r>
+            <a:r>
+              <a:rPr dirty="0"/>
+              <a:t>ig</a:t>
+            </a:r>
+            <a:r>
+              <a:rPr spc="-5" dirty="0"/>
+              <a:t>h</a:t>
+            </a:r>
+            <a:r>
+              <a:rPr dirty="0"/>
+              <a:t>t</a:t>
+            </a:r>
+            <a:r>
+              <a:rPr spc="20" dirty="0"/>
+              <a:t> </a:t>
+            </a:r>
+            <a:r>
+              <a:rPr dirty="0"/>
+              <a:t>© </a:t>
+            </a:r>
+            <a:r>
+              <a:rPr spc="-5" dirty="0"/>
+              <a:t>201</a:t>
+            </a:r>
+            <a:r>
+              <a:rPr dirty="0"/>
+              <a:t>8</a:t>
+            </a:r>
+            <a:r>
+              <a:rPr spc="25" dirty="0"/>
+              <a:t> </a:t>
+            </a:r>
+            <a:r>
+              <a:rPr dirty="0"/>
+              <a:t>| </a:t>
+            </a:r>
+            <a:r>
+              <a:rPr spc="85" dirty="0"/>
+              <a:t> </a:t>
+            </a:r>
+            <a:r>
+              <a:rPr dirty="0">
+                <a:solidFill>
+                  <a:srgbClr val="000000"/>
+                </a:solidFill>
+              </a:rPr>
+              <a:t>49</a:t>
+            </a:r>
+          </a:p>
+        </p:txBody>
+      </p:sp>
+      <p:sp>
+        <p:nvSpPr>
+          <p:cNvPr id="5" name="object 5"/>
+          <p:cNvSpPr txBox="1"/>
+          <p:nvPr/>
+        </p:nvSpPr>
+        <p:spPr>
+          <a:xfrm>
+            <a:off x="3965578" y="1626685"/>
+            <a:ext cx="6341745" cy="2492990"/>
+          </a:xfrm>
+          <a:prstGeom prst="rect">
+            <a:avLst/>
+          </a:prstGeom>
+        </p:spPr>
+        <p:txBody>
+          <a:bodyPr vert="horz" wrap="square" lIns="0" tIns="0" rIns="0" bIns="0" rtlCol="0">
+            <a:spAutoFit/>
+          </a:bodyPr>
+          <a:lstStyle/>
+          <a:p>
+            <a:pPr marL="12700">
+              <a:lnSpc>
+                <a:spcPct val="100000"/>
+              </a:lnSpc>
+            </a:pPr>
+            <a:r>
+              <a:rPr lang="en-US" spc="-10" dirty="0">
+                <a:latin typeface="Arial"/>
+                <a:cs typeface="Arial"/>
+              </a:rPr>
+              <a:t>This chapter covered the following:</a:t>
+            </a:r>
+          </a:p>
+          <a:p>
+            <a:pPr marL="12700">
+              <a:lnSpc>
+                <a:spcPct val="100000"/>
+              </a:lnSpc>
+            </a:pPr>
+            <a:endParaRPr lang="en-US" spc="-10" dirty="0">
+              <a:latin typeface="Arial"/>
+              <a:cs typeface="Arial"/>
+            </a:endParaRPr>
+          </a:p>
+          <a:p>
+            <a:pPr marL="298450" indent="-285750">
+              <a:lnSpc>
+                <a:spcPct val="100000"/>
+              </a:lnSpc>
+              <a:buFont typeface="Zapf Dingbats"/>
+              <a:buChar char="➠"/>
+            </a:pPr>
+            <a:r>
+              <a:rPr lang="en-US" dirty="0">
+                <a:latin typeface="Arial"/>
+                <a:cs typeface="Arial"/>
+              </a:rPr>
+              <a:t>Python’s text type: </a:t>
+            </a:r>
+            <a:r>
+              <a:rPr lang="en-US" dirty="0" err="1">
+                <a:latin typeface="Arial"/>
+                <a:cs typeface="Arial"/>
+              </a:rPr>
+              <a:t>str</a:t>
+            </a:r>
+            <a:endParaRPr lang="en-US" dirty="0">
+              <a:latin typeface="Arial"/>
+              <a:cs typeface="Arial"/>
+            </a:endParaRPr>
+          </a:p>
+          <a:p>
+            <a:pPr marL="298450" indent="-285750">
+              <a:lnSpc>
+                <a:spcPct val="100000"/>
+              </a:lnSpc>
+              <a:buFont typeface="Zapf Dingbats"/>
+              <a:buChar char="➠"/>
+            </a:pPr>
+            <a:r>
+              <a:rPr lang="en-US" dirty="0">
+                <a:latin typeface="Arial"/>
+                <a:cs typeface="Arial"/>
+              </a:rPr>
+              <a:t>Indexing, length and ranges of strings</a:t>
+            </a:r>
+          </a:p>
+          <a:p>
+            <a:pPr marL="298450" indent="-285750">
+              <a:lnSpc>
+                <a:spcPct val="100000"/>
+              </a:lnSpc>
+              <a:buFont typeface="Zapf Dingbats"/>
+              <a:buChar char="➠"/>
+            </a:pPr>
+            <a:r>
+              <a:rPr lang="en-US" dirty="0" err="1">
+                <a:latin typeface="Consolas" panose="020B0609020204030204" pitchFamily="49" charset="0"/>
+                <a:cs typeface="Consolas" panose="020B0609020204030204" pitchFamily="49" charset="0"/>
+              </a:rPr>
+              <a:t>str</a:t>
+            </a:r>
+            <a:r>
+              <a:rPr lang="en-US" dirty="0">
+                <a:latin typeface="Arial"/>
+                <a:cs typeface="Arial"/>
+              </a:rPr>
+              <a:t> has </a:t>
+            </a:r>
+            <a:r>
+              <a:rPr lang="en-US" i="1" dirty="0">
+                <a:latin typeface="Arial"/>
+                <a:cs typeface="Arial"/>
+              </a:rPr>
+              <a:t>methods</a:t>
+            </a:r>
+            <a:r>
+              <a:rPr lang="en-US" dirty="0">
+                <a:latin typeface="Arial"/>
+                <a:cs typeface="Arial"/>
+              </a:rPr>
+              <a:t> (remember this word)</a:t>
+            </a:r>
+          </a:p>
+          <a:p>
+            <a:pPr marL="298450" indent="-285750">
+              <a:lnSpc>
+                <a:spcPct val="100000"/>
+              </a:lnSpc>
+              <a:buFont typeface="Zapf Dingbats"/>
+              <a:buChar char="➠"/>
+            </a:pPr>
+            <a:r>
+              <a:rPr lang="en-US" dirty="0">
+                <a:latin typeface="Arial"/>
+                <a:cs typeface="Arial"/>
+              </a:rPr>
+              <a:t>Converting between types</a:t>
+            </a:r>
+          </a:p>
+          <a:p>
+            <a:pPr marL="298450" indent="-285750">
+              <a:lnSpc>
+                <a:spcPct val="100000"/>
+              </a:lnSpc>
+              <a:buFont typeface="Zapf Dingbats"/>
+              <a:buChar char="➠"/>
+            </a:pPr>
+            <a:r>
+              <a:rPr lang="en-US" dirty="0">
+                <a:latin typeface="Arial"/>
+                <a:cs typeface="Arial"/>
+              </a:rPr>
+              <a:t>Using format strings to produce readable code that outputs variables mixed with literal text.</a:t>
+            </a:r>
+          </a:p>
+          <a:p>
+            <a:pPr marL="298450" indent="-285750">
+              <a:lnSpc>
+                <a:spcPct val="100000"/>
+              </a:lnSpc>
+              <a:buFont typeface="Zapf Dingbats"/>
+              <a:buChar char="➠"/>
+            </a:pPr>
+            <a:endParaRPr lang="en-US" dirty="0">
+              <a:latin typeface="Arial" panose="020B0604020202020204" pitchFamily="34" charset="0"/>
+              <a:cs typeface="Arial" panose="020B0604020202020204" pitchFamily="34" charset="0"/>
+            </a:endParaRPr>
+          </a:p>
+        </p:txBody>
+      </p:sp>
+      <p:sp>
+        <p:nvSpPr>
+          <p:cNvPr id="7" name="object 2">
+            <a:extLst>
+              <a:ext uri="{FF2B5EF4-FFF2-40B4-BE49-F238E27FC236}">
+                <a16:creationId xmlns:a16="http://schemas.microsoft.com/office/drawing/2014/main" id="{9277B201-E278-DE48-98B0-34E967E6F14B}"/>
+              </a:ext>
+            </a:extLst>
+          </p:cNvPr>
+          <p:cNvSpPr txBox="1"/>
+          <p:nvPr/>
+        </p:nvSpPr>
+        <p:spPr>
+          <a:xfrm>
+            <a:off x="150678" y="216496"/>
+            <a:ext cx="1659255" cy="492443"/>
+          </a:xfrm>
+          <a:prstGeom prst="rect">
+            <a:avLst/>
+          </a:prstGeom>
+        </p:spPr>
+        <p:txBody>
+          <a:bodyPr vert="horz" wrap="square" lIns="0" tIns="0" rIns="0" bIns="0" rtlCol="0">
+            <a:spAutoFit/>
+          </a:bodyPr>
+          <a:lstStyle/>
+          <a:p>
+            <a:pPr marL="12700" marR="5080">
+              <a:lnSpc>
+                <a:spcPct val="100000"/>
+              </a:lnSpc>
+            </a:pPr>
+            <a:r>
+              <a:rPr lang="en-US" sz="1600" spc="-10" dirty="0">
+                <a:solidFill>
+                  <a:srgbClr val="FFFFFF"/>
+                </a:solidFill>
+                <a:latin typeface="Arial"/>
+                <a:cs typeface="Arial"/>
+              </a:rPr>
+              <a:t>Python 3 Beginner</a:t>
+            </a:r>
+            <a:endParaRPr sz="1600" dirty="0">
+              <a:latin typeface="Arial"/>
+              <a:cs typeface="Arial"/>
+            </a:endParaRPr>
+          </a:p>
+        </p:txBody>
+      </p:sp>
+    </p:spTree>
+    <p:extLst>
+      <p:ext uri="{BB962C8B-B14F-4D97-AF65-F5344CB8AC3E}">
+        <p14:creationId xmlns:p14="http://schemas.microsoft.com/office/powerpoint/2010/main" val="4192438850"/>
+      </p:ext>
+    </p:extLst>
+  </p:cSld>
+  <p:clrMapOvr>
+    <a:masterClrMapping/>
+  </p:clrMapOvr>
+</p:sld>
+</file>
+
+<file path=ppt/slides/slide36.xml><?xml version="1.0" encoding="utf-8"?>
 <p:sld xmlns:a="http://schemas.openxmlformats.org/drawingml/2006/main" xmlns:r="http://schemas.openxmlformats.org/officeDocument/2006/relationships" xmlns:p="http://schemas.openxmlformats.org/presentationml/2006/main">
   <p:cSld>
     <p:spTree>
@@ -20816,7 +21749,7 @@
 </p:sld>
 </file>
 
-<file path=ppt/slides/slide35.xml><?xml version="1.0" encoding="utf-8"?>
+<file path=ppt/slides/slide37.xml><?xml version="1.0" encoding="utf-8"?>
 <p:sld xmlns:a="http://schemas.openxmlformats.org/drawingml/2006/main" xmlns:r="http://schemas.openxmlformats.org/officeDocument/2006/relationships" xmlns:p="http://schemas.openxmlformats.org/presentationml/2006/main">
   <p:cSld>
     <p:spTree>
@@ -20963,7 +21896,7 @@
                   <a:spcPct val="100000"/>
                 </a:lnSpc>
               </a:pPr>
-              <a:t>35</a:t>
+              <a:t>37</a:t>
             </a:fld>
             <a:endParaRPr dirty="0">
               <a:solidFill>

</xml_diff>